<commit_message>
Add my part into the ppt by xl
</commit_message>
<xml_diff>
--- a/presentation/Final Presentation_mGrid.pptx
+++ b/presentation/Final Presentation_mGrid.pptx
@@ -15,8 +15,8 @@
     <p:sldId id="270" r:id="rId6"/>
     <p:sldId id="271" r:id="rId7"/>
     <p:sldId id="272" r:id="rId8"/>
-    <p:sldId id="273" r:id="rId9"/>
-    <p:sldId id="274" r:id="rId10"/>
+    <p:sldId id="276" r:id="rId9"/>
+    <p:sldId id="277" r:id="rId10"/>
     <p:sldId id="267" r:id="rId11"/>
   </p:sldIdLst>
   <p:sldSz cx="9144000" cy="6858000" type="screen4x3"/>
@@ -116,6 +116,22 @@
       </a:defRPr>
     </a:lvl9pPr>
   </p:defaultTextStyle>
+  <p:extLst>
+    <p:ext uri="{EFAFB233-063F-42B5-8137-9DF3F51BA10A}">
+      <p15:sldGuideLst xmlns:p15="http://schemas.microsoft.com/office/powerpoint/2012/main">
+        <p15:guide id="1" orient="horz" pos="2160">
+          <p15:clr>
+            <a:srgbClr val="A4A3A4"/>
+          </p15:clr>
+        </p15:guide>
+        <p15:guide id="2" pos="2880">
+          <p15:clr>
+            <a:srgbClr val="A4A3A4"/>
+          </p15:clr>
+        </p15:guide>
+      </p15:sldGuideLst>
+    </p:ext>
+  </p:extLst>
 </p:presentation>
 </file>
 
@@ -3645,11 +3661,6 @@
               </a:rPr>
               <a:t> with Electric Vehicles</a:t>
             </a:r>
-            <a:endParaRPr lang="en-US" altLang="ko-KR" sz="2400" b="1" dirty="0" smtClean="0">
-              <a:latin typeface="Ebrima" panose="02000000000000000000" pitchFamily="2" charset="0"/>
-              <a:ea typeface="Ebrima" panose="02000000000000000000" pitchFamily="2" charset="0"/>
-              <a:cs typeface="Ebrima" panose="02000000000000000000" pitchFamily="2" charset="0"/>
-            </a:endParaRPr>
           </a:p>
           <a:p>
             <a:pPr algn="ctr"/>
@@ -3667,15 +3678,7 @@
                 <a:ea typeface="Ebrima" panose="02000000000000000000" pitchFamily="2" charset="0"/>
                 <a:cs typeface="Ebrima" panose="02000000000000000000" pitchFamily="2" charset="0"/>
               </a:rPr>
-              <a:t>Modelling and Simulatin</a:t>
-            </a:r>
-            <a:r>
-              <a:rPr lang="en-US" altLang="ko-KR" b="1" dirty="0" smtClean="0">
-                <a:latin typeface="Ebrima" panose="02000000000000000000" pitchFamily="2" charset="0"/>
-                <a:ea typeface="Ebrima" panose="02000000000000000000" pitchFamily="2" charset="0"/>
-                <a:cs typeface="Ebrima" panose="02000000000000000000" pitchFamily="2" charset="0"/>
-              </a:rPr>
-              <a:t>g</a:t>
+              <a:t>Modelling and Simulating</a:t>
             </a:r>
           </a:p>
           <a:p>
@@ -3707,11 +3710,6 @@
               </a:rPr>
               <a:t>14 December 2015</a:t>
             </a:r>
-            <a:endParaRPr lang="en-US" altLang="ko-KR" b="1" dirty="0" smtClean="0">
-              <a:latin typeface="Ebrima" panose="02000000000000000000" pitchFamily="2" charset="0"/>
-              <a:ea typeface="Ebrima" panose="02000000000000000000" pitchFamily="2" charset="0"/>
-              <a:cs typeface="Ebrima" panose="02000000000000000000" pitchFamily="2" charset="0"/>
-            </a:endParaRPr>
           </a:p>
         </p:txBody>
       </p:sp>
@@ -3751,7 +3749,15 @@
                 <a:ea typeface="Ebrima" panose="02000000000000000000" pitchFamily="2" charset="0"/>
                 <a:cs typeface="Ebrima" panose="02000000000000000000" pitchFamily="2" charset="0"/>
               </a:rPr>
-              <a:t>ING</a:t>
+              <a:t>INGLIANG </a:t>
+            </a:r>
+            <a:r>
+              <a:rPr lang="en-US" altLang="ko-KR" sz="2400" b="1" dirty="0" smtClean="0">
+                <a:latin typeface="Ebrima" panose="02000000000000000000" pitchFamily="2" charset="0"/>
+                <a:ea typeface="Ebrima" panose="02000000000000000000" pitchFamily="2" charset="0"/>
+                <a:cs typeface="Ebrima" panose="02000000000000000000" pitchFamily="2" charset="0"/>
+              </a:rPr>
+              <a:t>F</a:t>
             </a:r>
             <a:r>
               <a:rPr lang="en-US" altLang="ko-KR" sz="2000" b="1" dirty="0" smtClean="0">
@@ -3759,37 +3765,8 @@
                 <a:ea typeface="Ebrima" panose="02000000000000000000" pitchFamily="2" charset="0"/>
                 <a:cs typeface="Ebrima" panose="02000000000000000000" pitchFamily="2" charset="0"/>
               </a:rPr>
-              <a:t>LIANG</a:t>
-            </a:r>
-            <a:r>
-              <a:rPr lang="en-US" altLang="ko-KR" sz="2000" b="1" dirty="0" smtClean="0">
-                <a:latin typeface="Ebrima" panose="02000000000000000000" pitchFamily="2" charset="0"/>
-                <a:ea typeface="Ebrima" panose="02000000000000000000" pitchFamily="2" charset="0"/>
-                <a:cs typeface="Ebrima" panose="02000000000000000000" pitchFamily="2" charset="0"/>
-              </a:rPr>
-              <a:t> </a:t>
-            </a:r>
-            <a:r>
-              <a:rPr lang="en-US" altLang="ko-KR" sz="2400" b="1" dirty="0" smtClean="0">
-                <a:latin typeface="Ebrima" panose="02000000000000000000" pitchFamily="2" charset="0"/>
-                <a:ea typeface="Ebrima" panose="02000000000000000000" pitchFamily="2" charset="0"/>
-                <a:cs typeface="Ebrima" panose="02000000000000000000" pitchFamily="2" charset="0"/>
-              </a:rPr>
-              <a:t>F</a:t>
-            </a:r>
-            <a:r>
-              <a:rPr lang="en-US" altLang="ko-KR" sz="2000" b="1" dirty="0" smtClean="0">
-                <a:latin typeface="Ebrima" panose="02000000000000000000" pitchFamily="2" charset="0"/>
-                <a:ea typeface="Ebrima" panose="02000000000000000000" pitchFamily="2" charset="0"/>
-                <a:cs typeface="Ebrima" panose="02000000000000000000" pitchFamily="2" charset="0"/>
-              </a:rPr>
               <a:t>ANG</a:t>
             </a:r>
-            <a:endParaRPr lang="en-US" altLang="ko-KR" sz="2000" b="1" dirty="0" smtClean="0">
-              <a:latin typeface="Ebrima" panose="02000000000000000000" pitchFamily="2" charset="0"/>
-              <a:ea typeface="Ebrima" panose="02000000000000000000" pitchFamily="2" charset="0"/>
-              <a:cs typeface="Ebrima" panose="02000000000000000000" pitchFamily="2" charset="0"/>
-            </a:endParaRPr>
           </a:p>
           <a:p>
             <a:r>
@@ -6323,7 +6300,7 @@
                         </a:spcAft>
                       </a:pPr>
                       <a:r>
-                        <a:rPr lang="en-GB" sz="1800">
+                        <a:rPr lang="en-GB" sz="1800" dirty="0">
                           <a:effectLst/>
                           <a:latin typeface="Ebrima" panose="02000000000000000000" pitchFamily="2" charset="0"/>
                           <a:ea typeface="Ebrima" panose="02000000000000000000" pitchFamily="2" charset="0"/>
@@ -6331,7 +6308,7 @@
                         </a:rPr>
                         <a:t>Number of Steps</a:t>
                       </a:r>
-                      <a:endParaRPr lang="ko-KR" sz="1800">
+                      <a:endParaRPr lang="ko-KR" sz="1800" dirty="0">
                         <a:effectLst/>
                         <a:latin typeface="Ebrima" panose="02000000000000000000" pitchFamily="2" charset="0"/>
                         <a:ea typeface="바탕"/>
@@ -6919,6 +6896,359 @@
       </p:grpSpPr>
       <p:sp>
         <p:nvSpPr>
+          <p:cNvPr id="19" name="TextBox 14"/>
+          <p:cNvSpPr txBox="1"/>
+          <p:nvPr/>
+        </p:nvSpPr>
+        <p:spPr>
+          <a:xfrm>
+            <a:off x="107504" y="1925402"/>
+            <a:ext cx="4329608" cy="4708981"/>
+          </a:xfrm>
+          <a:prstGeom prst="rect">
+            <a:avLst/>
+          </a:prstGeom>
+          <a:noFill/>
+        </p:spPr>
+        <p:txBody>
+          <a:bodyPr wrap="square" rtlCol="0">
+            <a:spAutoFit/>
+          </a:bodyPr>
+          <a:lstStyle/>
+          <a:p>
+            <a:pPr marL="342900" indent="-342900">
+              <a:lnSpc>
+                <a:spcPct val="150000"/>
+              </a:lnSpc>
+              <a:buFont typeface="Arial" panose="020B0604020202020204" pitchFamily="34" charset="0"/>
+              <a:buChar char="•"/>
+            </a:pPr>
+            <a:r>
+              <a:rPr lang="en-US" altLang="ko-KR" sz="2000" b="1" dirty="0" smtClean="0">
+                <a:solidFill>
+                  <a:schemeClr val="accent6"/>
+                </a:solidFill>
+                <a:latin typeface="Ebrima" panose="02000000000000000000" pitchFamily="2" charset="0"/>
+                <a:cs typeface="Ebrima" panose="02000000000000000000" pitchFamily="2" charset="0"/>
+              </a:rPr>
+              <a:t>Peak</a:t>
+            </a:r>
+            <a:r>
+              <a:rPr lang="en-US" altLang="ko-KR" sz="2000" b="1" dirty="0" smtClean="0">
+                <a:latin typeface="Ebrima" panose="02000000000000000000" pitchFamily="2" charset="0"/>
+                <a:cs typeface="Ebrima" panose="02000000000000000000" pitchFamily="2" charset="0"/>
+              </a:rPr>
+              <a:t> - </a:t>
+            </a:r>
+            <a:r>
+              <a:rPr lang="en-US" altLang="ko-KR" sz="2000" b="1" dirty="0" smtClean="0">
+                <a:solidFill>
+                  <a:srgbClr val="00B050"/>
+                </a:solidFill>
+                <a:latin typeface="Ebrima" panose="02000000000000000000" pitchFamily="2" charset="0"/>
+                <a:cs typeface="Ebrima" panose="02000000000000000000" pitchFamily="2" charset="0"/>
+              </a:rPr>
+              <a:t>Valley</a:t>
+            </a:r>
+            <a:endParaRPr lang="en-US" altLang="ko-KR" sz="2000" b="1" dirty="0" smtClean="0">
+              <a:solidFill>
+                <a:srgbClr val="00B050"/>
+              </a:solidFill>
+              <a:latin typeface="Ebrima" panose="02000000000000000000" pitchFamily="2" charset="0"/>
+              <a:cs typeface="Ebrima" panose="02000000000000000000" pitchFamily="2" charset="0"/>
+            </a:endParaRPr>
+          </a:p>
+          <a:p>
+            <a:pPr>
+              <a:lnSpc>
+                <a:spcPct val="150000"/>
+              </a:lnSpc>
+            </a:pPr>
+            <a:r>
+              <a:rPr lang="en-US" altLang="ko-KR" sz="2000" dirty="0" smtClean="0">
+                <a:latin typeface="Ebrima" panose="02000000000000000000" pitchFamily="2" charset="0"/>
+                <a:cs typeface="Ebrima" panose="02000000000000000000" pitchFamily="2" charset="0"/>
+              </a:rPr>
+              <a:t>-&gt; </a:t>
+            </a:r>
+            <a:r>
+              <a:rPr lang="en-US" altLang="ko-KR" sz="2000" dirty="0">
+                <a:latin typeface="Ebrima" panose="02000000000000000000" pitchFamily="2" charset="0"/>
+                <a:cs typeface="Ebrima" panose="02000000000000000000" pitchFamily="2" charset="0"/>
+              </a:rPr>
+              <a:t>Robustness of the </a:t>
+            </a:r>
+            <a:r>
+              <a:rPr lang="en-US" altLang="ko-KR" sz="2000" dirty="0" smtClean="0">
+                <a:latin typeface="Ebrima" panose="02000000000000000000" pitchFamily="2" charset="0"/>
+                <a:cs typeface="Ebrima" panose="02000000000000000000" pitchFamily="2" charset="0"/>
+              </a:rPr>
+              <a:t>grid</a:t>
+            </a:r>
+          </a:p>
+          <a:p>
+            <a:pPr marL="342900" indent="-342900">
+              <a:lnSpc>
+                <a:spcPct val="150000"/>
+              </a:lnSpc>
+              <a:buFont typeface="Arial" panose="020B0604020202020204" pitchFamily="34" charset="0"/>
+              <a:buChar char="•"/>
+            </a:pPr>
+            <a:r>
+              <a:rPr lang="en-US" altLang="ko-KR" sz="2000" b="1" dirty="0" smtClean="0">
+                <a:latin typeface="Ebrima" panose="02000000000000000000" pitchFamily="2" charset="0"/>
+                <a:cs typeface="Ebrima" panose="02000000000000000000" pitchFamily="2" charset="0"/>
+              </a:rPr>
+              <a:t>Off/ </a:t>
+            </a:r>
+            <a:r>
+              <a:rPr lang="en-US" altLang="ko-KR" sz="2000" b="1" dirty="0" smtClean="0">
+                <a:solidFill>
+                  <a:srgbClr val="FFC000"/>
+                </a:solidFill>
+                <a:latin typeface="Ebrima" panose="02000000000000000000" pitchFamily="2" charset="0"/>
+                <a:cs typeface="Ebrima" panose="02000000000000000000" pitchFamily="2" charset="0"/>
+              </a:rPr>
+              <a:t>Peak Pricing</a:t>
+            </a:r>
+            <a:endParaRPr lang="en-US" altLang="ko-KR" sz="2000" b="1" dirty="0">
+              <a:solidFill>
+                <a:srgbClr val="FFC000"/>
+              </a:solidFill>
+              <a:latin typeface="Ebrima" panose="02000000000000000000" pitchFamily="2" charset="0"/>
+              <a:cs typeface="Ebrima" panose="02000000000000000000" pitchFamily="2" charset="0"/>
+            </a:endParaRPr>
+          </a:p>
+          <a:p>
+            <a:pPr>
+              <a:lnSpc>
+                <a:spcPct val="150000"/>
+              </a:lnSpc>
+            </a:pPr>
+            <a:r>
+              <a:rPr lang="en-US" altLang="ko-KR" sz="2000" dirty="0">
+                <a:latin typeface="Ebrima" panose="02000000000000000000" pitchFamily="2" charset="0"/>
+                <a:cs typeface="Ebrima" panose="02000000000000000000" pitchFamily="2" charset="0"/>
+              </a:rPr>
+              <a:t>-&gt; </a:t>
+            </a:r>
+            <a:r>
+              <a:rPr lang="en-US" altLang="ko-KR" sz="2000" dirty="0" smtClean="0">
+                <a:latin typeface="Ebrima" panose="02000000000000000000" pitchFamily="2" charset="0"/>
+                <a:cs typeface="Ebrima" panose="02000000000000000000" pitchFamily="2" charset="0"/>
+              </a:rPr>
+              <a:t>Cost for the customers</a:t>
+            </a:r>
+          </a:p>
+          <a:p>
+            <a:pPr marL="342900" indent="-342900">
+              <a:lnSpc>
+                <a:spcPct val="150000"/>
+              </a:lnSpc>
+              <a:buFont typeface="Arial" panose="020B0604020202020204" pitchFamily="34" charset="0"/>
+              <a:buChar char="•"/>
+            </a:pPr>
+            <a:r>
+              <a:rPr lang="en-US" altLang="ko-KR" sz="2000" b="1" dirty="0">
+                <a:latin typeface="Ebrima" panose="02000000000000000000" pitchFamily="2" charset="0"/>
+                <a:cs typeface="Ebrima" panose="02000000000000000000" pitchFamily="2" charset="0"/>
+              </a:rPr>
+              <a:t>Diurnal Driving</a:t>
+            </a:r>
+          </a:p>
+          <a:p>
+            <a:pPr>
+              <a:lnSpc>
+                <a:spcPct val="150000"/>
+              </a:lnSpc>
+            </a:pPr>
+            <a:endParaRPr lang="en-US" altLang="ko-KR" sz="2000" dirty="0">
+              <a:latin typeface="Ebrima" panose="02000000000000000000" pitchFamily="2" charset="0"/>
+              <a:cs typeface="Ebrima" panose="02000000000000000000" pitchFamily="2" charset="0"/>
+            </a:endParaRPr>
+          </a:p>
+          <a:p>
+            <a:pPr>
+              <a:lnSpc>
+                <a:spcPct val="150000"/>
+              </a:lnSpc>
+            </a:pPr>
+            <a:endParaRPr lang="en-US" altLang="ko-KR" sz="2000" dirty="0" smtClean="0">
+              <a:latin typeface="Ebrima" panose="02000000000000000000" pitchFamily="2" charset="0"/>
+              <a:cs typeface="Ebrima" panose="02000000000000000000" pitchFamily="2" charset="0"/>
+            </a:endParaRPr>
+          </a:p>
+          <a:p>
+            <a:pPr>
+              <a:lnSpc>
+                <a:spcPct val="150000"/>
+              </a:lnSpc>
+            </a:pPr>
+            <a:endParaRPr lang="en-US" altLang="ko-KR" sz="2000" dirty="0">
+              <a:latin typeface="Ebrima" panose="02000000000000000000" pitchFamily="2" charset="0"/>
+              <a:cs typeface="Ebrima" panose="02000000000000000000" pitchFamily="2" charset="0"/>
+            </a:endParaRPr>
+          </a:p>
+          <a:p>
+            <a:pPr>
+              <a:lnSpc>
+                <a:spcPct val="150000"/>
+              </a:lnSpc>
+            </a:pPr>
+            <a:endParaRPr lang="en-US" altLang="ko-KR" sz="2000" dirty="0" smtClean="0">
+              <a:latin typeface="Ebrima" panose="02000000000000000000" pitchFamily="2" charset="0"/>
+              <a:cs typeface="Ebrima" panose="02000000000000000000" pitchFamily="2" charset="0"/>
+            </a:endParaRPr>
+          </a:p>
+          <a:p>
+            <a:pPr>
+              <a:lnSpc>
+                <a:spcPct val="150000"/>
+              </a:lnSpc>
+            </a:pPr>
+            <a:endParaRPr lang="en-US" altLang="ko-KR" sz="2000" dirty="0" smtClean="0">
+              <a:latin typeface="Ebrima" panose="02000000000000000000" pitchFamily="2" charset="0"/>
+              <a:cs typeface="Ebrima" panose="02000000000000000000" pitchFamily="2" charset="0"/>
+            </a:endParaRPr>
+          </a:p>
+        </p:txBody>
+      </p:sp>
+      <p:pic>
+        <p:nvPicPr>
+          <p:cNvPr id="3" name="图片 2"/>
+          <p:cNvPicPr>
+            <a:picLocks noChangeAspect="1"/>
+          </p:cNvPicPr>
+          <p:nvPr/>
+        </p:nvPicPr>
+        <p:blipFill>
+          <a:blip r:embed="rId2"/>
+          <a:stretch>
+            <a:fillRect/>
+          </a:stretch>
+        </p:blipFill>
+        <p:spPr>
+          <a:xfrm>
+            <a:off x="3059832" y="908721"/>
+            <a:ext cx="6120000" cy="4602585"/>
+          </a:xfrm>
+          <a:prstGeom prst="rect">
+            <a:avLst/>
+          </a:prstGeom>
+        </p:spPr>
+      </p:pic>
+      <p:cxnSp>
+        <p:nvCxnSpPr>
+          <p:cNvPr id="8" name="直线连接符 7"/>
+          <p:cNvCxnSpPr/>
+          <p:nvPr/>
+        </p:nvCxnSpPr>
+        <p:spPr>
+          <a:xfrm>
+            <a:off x="3635216" y="4725144"/>
+            <a:ext cx="5400600" cy="0"/>
+          </a:xfrm>
+          <a:prstGeom prst="line">
+            <a:avLst/>
+          </a:prstGeom>
+          <a:ln w="28575"/>
+        </p:spPr>
+        <p:style>
+          <a:lnRef idx="1">
+            <a:schemeClr val="accent3"/>
+          </a:lnRef>
+          <a:fillRef idx="0">
+            <a:schemeClr val="accent3"/>
+          </a:fillRef>
+          <a:effectRef idx="0">
+            <a:schemeClr val="accent3"/>
+          </a:effectRef>
+          <a:fontRef idx="minor">
+            <a:schemeClr val="tx1"/>
+          </a:fontRef>
+        </p:style>
+      </p:cxnSp>
+      <p:cxnSp>
+        <p:nvCxnSpPr>
+          <p:cNvPr id="9" name="直线连接符 8"/>
+          <p:cNvCxnSpPr/>
+          <p:nvPr/>
+        </p:nvCxnSpPr>
+        <p:spPr>
+          <a:xfrm>
+            <a:off x="3635216" y="3356992"/>
+            <a:ext cx="5400600" cy="0"/>
+          </a:xfrm>
+          <a:prstGeom prst="line">
+            <a:avLst/>
+          </a:prstGeom>
+          <a:ln w="28575"/>
+        </p:spPr>
+        <p:style>
+          <a:lnRef idx="1">
+            <a:schemeClr val="accent6"/>
+          </a:lnRef>
+          <a:fillRef idx="0">
+            <a:schemeClr val="accent6"/>
+          </a:fillRef>
+          <a:effectRef idx="0">
+            <a:schemeClr val="accent6"/>
+          </a:effectRef>
+          <a:fontRef idx="minor">
+            <a:schemeClr val="tx1"/>
+          </a:fontRef>
+        </p:style>
+      </p:cxnSp>
+      <p:sp>
+        <p:nvSpPr>
+          <p:cNvPr id="10" name="矩形 9"/>
+          <p:cNvSpPr/>
+          <p:nvPr/>
+        </p:nvSpPr>
+        <p:spPr>
+          <a:xfrm>
+            <a:off x="6299512" y="1268760"/>
+            <a:ext cx="1800200" cy="3744416"/>
+          </a:xfrm>
+          <a:prstGeom prst="rect">
+            <a:avLst/>
+          </a:prstGeom>
+          <a:solidFill>
+            <a:srgbClr val="FFC000">
+              <a:alpha val="30000"/>
+            </a:srgbClr>
+          </a:solidFill>
+          <a:ln>
+            <a:noFill/>
+          </a:ln>
+        </p:spPr>
+        <p:style>
+          <a:lnRef idx="2">
+            <a:schemeClr val="accent1">
+              <a:shade val="50000"/>
+            </a:schemeClr>
+          </a:lnRef>
+          <a:fillRef idx="1">
+            <a:schemeClr val="accent1"/>
+          </a:fillRef>
+          <a:effectRef idx="0">
+            <a:schemeClr val="accent1"/>
+          </a:effectRef>
+          <a:fontRef idx="minor">
+            <a:schemeClr val="lt1"/>
+          </a:fontRef>
+        </p:style>
+        <p:txBody>
+          <a:bodyPr rtlCol="0" anchor="ctr"/>
+          <a:lstStyle/>
+          <a:p>
+            <a:pPr algn="ctr"/>
+            <a:endParaRPr kumimoji="1" lang="zh-CN" altLang="en-US"/>
+          </a:p>
+        </p:txBody>
+      </p:sp>
+      <p:sp>
+        <p:nvSpPr>
           <p:cNvPr id="4" name="직사각형 3"/>
           <p:cNvSpPr/>
           <p:nvPr/>
@@ -6972,7 +7302,7 @@
         <p:spPr>
           <a:xfrm>
             <a:off x="107504" y="44624"/>
-            <a:ext cx="6300192" cy="646331"/>
+            <a:ext cx="8784976" cy="646331"/>
           </a:xfrm>
           <a:prstGeom prst="rect">
             <a:avLst/>
@@ -6991,7 +7321,7 @@
                 <a:ea typeface="Ebrima" panose="02000000000000000000" pitchFamily="2" charset="0"/>
                 <a:cs typeface="Ebrima" panose="02000000000000000000" pitchFamily="2" charset="0"/>
               </a:rPr>
-              <a:t>A</a:t>
+              <a:t>R</a:t>
             </a:r>
             <a:r>
               <a:rPr lang="en-US" altLang="ko-KR" sz="2800" b="1" dirty="0" smtClean="0">
@@ -6999,7 +7329,7 @@
                 <a:ea typeface="Ebrima" panose="02000000000000000000" pitchFamily="2" charset="0"/>
                 <a:cs typeface="Ebrima" panose="02000000000000000000" pitchFamily="2" charset="0"/>
               </a:rPr>
-              <a:t>LTERNATIVE </a:t>
+              <a:t>ESULTS AND </a:t>
             </a:r>
             <a:r>
               <a:rPr lang="en-US" altLang="ko-KR" sz="3600" b="1" dirty="0" smtClean="0">
@@ -7007,7 +7337,7 @@
                 <a:ea typeface="Ebrima" panose="02000000000000000000" pitchFamily="2" charset="0"/>
                 <a:cs typeface="Ebrima" panose="02000000000000000000" pitchFamily="2" charset="0"/>
               </a:rPr>
-              <a:t>P</a:t>
+              <a:t>D</a:t>
             </a:r>
             <a:r>
               <a:rPr lang="en-US" altLang="ko-KR" sz="2800" b="1" dirty="0" smtClean="0">
@@ -7015,750 +7345,75 @@
                 <a:ea typeface="Ebrima" panose="02000000000000000000" pitchFamily="2" charset="0"/>
                 <a:cs typeface="Ebrima" panose="02000000000000000000" pitchFamily="2" charset="0"/>
               </a:rPr>
-              <a:t>LANS</a:t>
-            </a:r>
-            <a:endParaRPr lang="ko-KR" altLang="en-US" sz="2800" b="1" dirty="0">
+              <a:t>ISCUSSION- </a:t>
+            </a:r>
+            <a:r>
+              <a:rPr lang="en-US" altLang="ko-KR" sz="2400" b="1" dirty="0" smtClean="0">
+                <a:latin typeface="Ebrima" panose="02000000000000000000" pitchFamily="2" charset="0"/>
+                <a:ea typeface="Ebrima" panose="02000000000000000000" pitchFamily="2" charset="0"/>
+                <a:cs typeface="Ebrima" panose="02000000000000000000" pitchFamily="2" charset="0"/>
+              </a:rPr>
+              <a:t>Preliminary </a:t>
+            </a:r>
+            <a:r>
+              <a:rPr lang="en-US" altLang="ko-KR" sz="2400" b="1" dirty="0">
+                <a:latin typeface="Ebrima" panose="02000000000000000000" pitchFamily="2" charset="0"/>
+                <a:ea typeface="Ebrima" panose="02000000000000000000" pitchFamily="2" charset="0"/>
+                <a:cs typeface="Ebrima" panose="02000000000000000000" pitchFamily="2" charset="0"/>
+              </a:rPr>
+              <a:t>Experiment</a:t>
+            </a:r>
+            <a:endParaRPr lang="ko-KR" altLang="en-US" sz="2400" b="1" dirty="0">
               <a:latin typeface="Ebrima" panose="02000000000000000000" pitchFamily="2" charset="0"/>
               <a:cs typeface="Ebrima" panose="02000000000000000000" pitchFamily="2" charset="0"/>
             </a:endParaRPr>
           </a:p>
         </p:txBody>
       </p:sp>
-      <p:grpSp>
-        <p:nvGrpSpPr>
-          <p:cNvPr id="8" name="그룹 7"/>
-          <p:cNvGrpSpPr/>
+      <p:sp>
+        <p:nvSpPr>
+          <p:cNvPr id="11" name="TextBox 20"/>
+          <p:cNvSpPr txBox="1"/>
           <p:nvPr/>
-        </p:nvGrpSpPr>
-        <p:grpSpPr>
-          <a:xfrm>
-            <a:off x="252000" y="764696"/>
-            <a:ext cx="8640000" cy="3240000"/>
-            <a:chOff x="504000" y="764696"/>
-            <a:chExt cx="8640000" cy="3240000"/>
-          </a:xfrm>
-        </p:grpSpPr>
-        <p:pic>
-          <p:nvPicPr>
-            <p:cNvPr id="3" name="그림 2"/>
-            <p:cNvPicPr>
-              <a:picLocks noChangeAspect="1"/>
-            </p:cNvPicPr>
-            <p:nvPr/>
-          </p:nvPicPr>
-          <p:blipFill>
-            <a:blip r:embed="rId2">
-              <a:extLst>
-                <a:ext uri="{28A0092B-C50C-407E-A947-70E740481C1C}">
-                  <a14:useLocalDpi xmlns:a14="http://schemas.microsoft.com/office/drawing/2010/main" val="0"/>
-                </a:ext>
-              </a:extLst>
-            </a:blip>
-            <a:stretch>
-              <a:fillRect/>
-            </a:stretch>
-          </p:blipFill>
-          <p:spPr>
-            <a:xfrm>
-              <a:off x="504000" y="764696"/>
-              <a:ext cx="4320000" cy="3240000"/>
-            </a:xfrm>
-            <a:prstGeom prst="rect">
-              <a:avLst/>
-            </a:prstGeom>
-          </p:spPr>
-        </p:pic>
-        <p:pic>
-          <p:nvPicPr>
-            <p:cNvPr id="6" name="그림 5"/>
-            <p:cNvPicPr>
-              <a:picLocks noChangeAspect="1"/>
-            </p:cNvPicPr>
-            <p:nvPr/>
-          </p:nvPicPr>
-          <p:blipFill>
-            <a:blip r:embed="rId3">
-              <a:extLst>
-                <a:ext uri="{28A0092B-C50C-407E-A947-70E740481C1C}">
-                  <a14:useLocalDpi xmlns:a14="http://schemas.microsoft.com/office/drawing/2010/main" val="0"/>
-                </a:ext>
-              </a:extLst>
-            </a:blip>
-            <a:stretch>
-              <a:fillRect/>
-            </a:stretch>
-          </p:blipFill>
-          <p:spPr>
-            <a:xfrm>
-              <a:off x="4824000" y="764696"/>
-              <a:ext cx="4320000" cy="3240000"/>
-            </a:xfrm>
-            <a:prstGeom prst="rect">
-              <a:avLst/>
-            </a:prstGeom>
-          </p:spPr>
-        </p:pic>
-      </p:grpSp>
-      <p:graphicFrame>
-        <p:nvGraphicFramePr>
-          <p:cNvPr id="10" name="표 9"/>
-          <p:cNvGraphicFramePr>
-            <a:graphicFrameLocks noGrp="1"/>
-          </p:cNvGraphicFramePr>
-          <p:nvPr>
-            <p:extLst>
-              <p:ext uri="{D42A27DB-BD31-4B8C-83A1-F6EECF244321}">
-                <p14:modId xmlns:p14="http://schemas.microsoft.com/office/powerpoint/2010/main" val="1701499915"/>
-              </p:ext>
-            </p:extLst>
-          </p:nvPr>
-        </p:nvGraphicFramePr>
-        <p:xfrm>
-          <a:off x="1524000" y="4149080"/>
-          <a:ext cx="6096000" cy="2595512"/>
-        </p:xfrm>
-        <a:graphic>
-          <a:graphicData uri="http://schemas.openxmlformats.org/drawingml/2006/table">
-            <a:tbl>
-              <a:tblPr firstRow="1" bandRow="1">
-                <a:tableStyleId>{5C22544A-7EE6-4342-B048-85BDC9FD1C3A}</a:tableStyleId>
-              </a:tblPr>
-              <a:tblGrid>
-                <a:gridCol w="2032000"/>
-                <a:gridCol w="2032000"/>
-                <a:gridCol w="2032000"/>
-              </a:tblGrid>
-              <a:tr h="370472">
-                <a:tc>
-                  <a:txBody>
-                    <a:bodyPr/>
-                    <a:lstStyle/>
-                    <a:p>
-                      <a:pPr algn="ctr">
-                        <a:spcAft>
-                          <a:spcPts val="0"/>
-                        </a:spcAft>
-                      </a:pPr>
-                      <a:r>
-                        <a:rPr lang="en-GB" sz="1800" dirty="0">
-                          <a:effectLst/>
-                          <a:latin typeface="Ebrima" panose="02000000000000000000" pitchFamily="2" charset="0"/>
-                          <a:ea typeface="Ebrima" panose="02000000000000000000" pitchFamily="2" charset="0"/>
-                          <a:cs typeface="Ebrima" panose="02000000000000000000" pitchFamily="2" charset="0"/>
-                        </a:rPr>
-                        <a:t> </a:t>
-                      </a:r>
-                      <a:endParaRPr lang="ko-KR" sz="1800" dirty="0">
-                        <a:effectLst/>
-                        <a:latin typeface="Ebrima" panose="02000000000000000000" pitchFamily="2" charset="0"/>
-                        <a:ea typeface="바탕"/>
-                        <a:cs typeface="Ebrima" panose="02000000000000000000" pitchFamily="2" charset="0"/>
-                      </a:endParaRPr>
-                    </a:p>
-                  </a:txBody>
-                  <a:tcPr marL="68580" marR="68580" marT="0" marB="0" anchor="ctr"/>
-                </a:tc>
-                <a:tc>
-                  <a:txBody>
-                    <a:bodyPr/>
-                    <a:lstStyle/>
-                    <a:p>
-                      <a:pPr algn="ctr">
-                        <a:spcAft>
-                          <a:spcPts val="0"/>
-                        </a:spcAft>
-                      </a:pPr>
-                      <a:r>
-                        <a:rPr lang="en-GB" sz="1800" dirty="0">
-                          <a:effectLst/>
-                          <a:latin typeface="Ebrima" panose="02000000000000000000" pitchFamily="2" charset="0"/>
-                          <a:ea typeface="Ebrima" panose="02000000000000000000" pitchFamily="2" charset="0"/>
-                          <a:cs typeface="Ebrima" panose="02000000000000000000" pitchFamily="2" charset="0"/>
-                        </a:rPr>
-                        <a:t>Start</a:t>
-                      </a:r>
-                      <a:endParaRPr lang="ko-KR" sz="1800" dirty="0">
-                        <a:effectLst/>
-                        <a:latin typeface="Ebrima" panose="02000000000000000000" pitchFamily="2" charset="0"/>
-                        <a:ea typeface="바탕"/>
-                        <a:cs typeface="Ebrima" panose="02000000000000000000" pitchFamily="2" charset="0"/>
-                      </a:endParaRPr>
-                    </a:p>
-                  </a:txBody>
-                  <a:tcPr marL="68580" marR="68580" marT="0" marB="0" anchor="ctr"/>
-                </a:tc>
-                <a:tc>
-                  <a:txBody>
-                    <a:bodyPr/>
-                    <a:lstStyle/>
-                    <a:p>
-                      <a:pPr algn="ctr">
-                        <a:spcAft>
-                          <a:spcPts val="0"/>
-                        </a:spcAft>
-                      </a:pPr>
-                      <a:r>
-                        <a:rPr lang="en-GB" sz="1800">
-                          <a:effectLst/>
-                          <a:latin typeface="Ebrima" panose="02000000000000000000" pitchFamily="2" charset="0"/>
-                          <a:ea typeface="Ebrima" panose="02000000000000000000" pitchFamily="2" charset="0"/>
-                          <a:cs typeface="Ebrima" panose="02000000000000000000" pitchFamily="2" charset="0"/>
-                        </a:rPr>
-                        <a:t>Number of Steps</a:t>
-                      </a:r>
-                      <a:endParaRPr lang="ko-KR" sz="1800">
-                        <a:effectLst/>
-                        <a:latin typeface="Ebrima" panose="02000000000000000000" pitchFamily="2" charset="0"/>
-                        <a:ea typeface="바탕"/>
-                        <a:cs typeface="Ebrima" panose="02000000000000000000" pitchFamily="2" charset="0"/>
-                      </a:endParaRPr>
-                    </a:p>
-                  </a:txBody>
-                  <a:tcPr marL="68580" marR="68580" marT="0" marB="0" anchor="ctr"/>
-                </a:tc>
-              </a:tr>
-              <a:tr h="370840">
-                <a:tc>
-                  <a:txBody>
-                    <a:bodyPr/>
-                    <a:lstStyle/>
-                    <a:p>
-                      <a:pPr algn="ctr">
-                        <a:spcAft>
-                          <a:spcPts val="0"/>
-                        </a:spcAft>
-                      </a:pPr>
-                      <a:r>
-                        <a:rPr lang="en-GB" sz="1800" dirty="0">
-                          <a:effectLst/>
-                          <a:latin typeface="Ebrima" panose="02000000000000000000" pitchFamily="2" charset="0"/>
-                          <a:ea typeface="Ebrima" panose="02000000000000000000" pitchFamily="2" charset="0"/>
-                          <a:cs typeface="Ebrima" panose="02000000000000000000" pitchFamily="2" charset="0"/>
-                        </a:rPr>
-                        <a:t>Original Plan</a:t>
-                      </a:r>
-                      <a:endParaRPr lang="ko-KR" sz="1800" dirty="0">
-                        <a:effectLst/>
-                        <a:latin typeface="Ebrima" panose="02000000000000000000" pitchFamily="2" charset="0"/>
-                        <a:ea typeface="바탕"/>
-                        <a:cs typeface="Ebrima" panose="02000000000000000000" pitchFamily="2" charset="0"/>
-                      </a:endParaRPr>
-                    </a:p>
-                  </a:txBody>
-                  <a:tcPr marL="68580" marR="68580" marT="0" marB="0" anchor="ctr"/>
-                </a:tc>
-                <a:tc>
-                  <a:txBody>
-                    <a:bodyPr/>
-                    <a:lstStyle/>
-                    <a:p>
-                      <a:pPr algn="ctr">
-                        <a:spcAft>
-                          <a:spcPts val="0"/>
-                        </a:spcAft>
-                      </a:pPr>
-                      <a:r>
-                        <a:rPr lang="en-GB" sz="1800" dirty="0">
-                          <a:effectLst/>
-                          <a:latin typeface="Ebrima" panose="02000000000000000000" pitchFamily="2" charset="0"/>
-                          <a:ea typeface="Ebrima" panose="02000000000000000000" pitchFamily="2" charset="0"/>
-                          <a:cs typeface="Ebrima" panose="02000000000000000000" pitchFamily="2" charset="0"/>
-                        </a:rPr>
-                        <a:t>Immediate</a:t>
-                      </a:r>
-                      <a:endParaRPr lang="ko-KR" sz="1800" dirty="0">
-                        <a:effectLst/>
-                        <a:latin typeface="Ebrima" panose="02000000000000000000" pitchFamily="2" charset="0"/>
-                        <a:ea typeface="바탕"/>
-                        <a:cs typeface="Ebrima" panose="02000000000000000000" pitchFamily="2" charset="0"/>
-                      </a:endParaRPr>
-                    </a:p>
-                  </a:txBody>
-                  <a:tcPr marL="68580" marR="68580" marT="0" marB="0" anchor="ctr"/>
-                </a:tc>
-                <a:tc>
-                  <a:txBody>
-                    <a:bodyPr/>
-                    <a:lstStyle/>
-                    <a:p>
-                      <a:pPr algn="ctr">
-                        <a:spcAft>
-                          <a:spcPts val="0"/>
-                        </a:spcAft>
-                      </a:pPr>
-                      <a:r>
-                        <a:rPr lang="en-GB" sz="1800">
-                          <a:effectLst/>
-                          <a:latin typeface="Ebrima" panose="02000000000000000000" pitchFamily="2" charset="0"/>
-                          <a:ea typeface="Ebrima" panose="02000000000000000000" pitchFamily="2" charset="0"/>
-                          <a:cs typeface="Ebrima" panose="02000000000000000000" pitchFamily="2" charset="0"/>
-                        </a:rPr>
-                        <a:t>1</a:t>
-                      </a:r>
-                      <a:endParaRPr lang="ko-KR" sz="1800">
-                        <a:effectLst/>
-                        <a:latin typeface="Ebrima" panose="02000000000000000000" pitchFamily="2" charset="0"/>
-                        <a:ea typeface="바탕"/>
-                        <a:cs typeface="Ebrima" panose="02000000000000000000" pitchFamily="2" charset="0"/>
-                      </a:endParaRPr>
-                    </a:p>
-                  </a:txBody>
-                  <a:tcPr marL="68580" marR="68580" marT="0" marB="0" anchor="ctr"/>
-                </a:tc>
-              </a:tr>
-              <a:tr h="370840">
-                <a:tc>
-                  <a:txBody>
-                    <a:bodyPr/>
-                    <a:lstStyle/>
-                    <a:p>
-                      <a:pPr algn="ctr">
-                        <a:spcAft>
-                          <a:spcPts val="0"/>
-                        </a:spcAft>
-                      </a:pPr>
-                      <a:r>
-                        <a:rPr lang="en-GB" sz="1800">
-                          <a:effectLst/>
-                          <a:latin typeface="Ebrima" panose="02000000000000000000" pitchFamily="2" charset="0"/>
-                          <a:ea typeface="Ebrima" panose="02000000000000000000" pitchFamily="2" charset="0"/>
-                          <a:cs typeface="Ebrima" panose="02000000000000000000" pitchFamily="2" charset="0"/>
-                        </a:rPr>
-                        <a:t>Alternative Plan 1</a:t>
-                      </a:r>
-                      <a:endParaRPr lang="ko-KR" sz="1800">
-                        <a:effectLst/>
-                        <a:latin typeface="Ebrima" panose="02000000000000000000" pitchFamily="2" charset="0"/>
-                        <a:ea typeface="바탕"/>
-                        <a:cs typeface="Ebrima" panose="02000000000000000000" pitchFamily="2" charset="0"/>
-                      </a:endParaRPr>
-                    </a:p>
-                  </a:txBody>
-                  <a:tcPr marL="68580" marR="68580" marT="0" marB="0" anchor="ctr"/>
-                </a:tc>
-                <a:tc>
-                  <a:txBody>
-                    <a:bodyPr/>
-                    <a:lstStyle/>
-                    <a:p>
-                      <a:pPr algn="ctr">
-                        <a:spcAft>
-                          <a:spcPts val="0"/>
-                        </a:spcAft>
-                      </a:pPr>
-                      <a:r>
-                        <a:rPr lang="en-GB" sz="1800" dirty="0">
-                          <a:effectLst/>
-                          <a:latin typeface="Ebrima" panose="02000000000000000000" pitchFamily="2" charset="0"/>
-                          <a:ea typeface="Ebrima" panose="02000000000000000000" pitchFamily="2" charset="0"/>
-                          <a:cs typeface="Ebrima" panose="02000000000000000000" pitchFamily="2" charset="0"/>
-                        </a:rPr>
-                        <a:t>Random</a:t>
-                      </a:r>
-                      <a:endParaRPr lang="ko-KR" sz="1800" dirty="0">
-                        <a:effectLst/>
-                        <a:latin typeface="Ebrima" panose="02000000000000000000" pitchFamily="2" charset="0"/>
-                        <a:ea typeface="바탕"/>
-                        <a:cs typeface="Ebrima" panose="02000000000000000000" pitchFamily="2" charset="0"/>
-                      </a:endParaRPr>
-                    </a:p>
-                  </a:txBody>
-                  <a:tcPr marL="68580" marR="68580" marT="0" marB="0" anchor="ctr"/>
-                </a:tc>
-                <a:tc>
-                  <a:txBody>
-                    <a:bodyPr/>
-                    <a:lstStyle/>
-                    <a:p>
-                      <a:pPr algn="ctr">
-                        <a:spcAft>
-                          <a:spcPts val="0"/>
-                        </a:spcAft>
-                      </a:pPr>
-                      <a:r>
-                        <a:rPr lang="en-GB" sz="1800">
-                          <a:effectLst/>
-                          <a:latin typeface="Ebrima" panose="02000000000000000000" pitchFamily="2" charset="0"/>
-                          <a:ea typeface="Ebrima" panose="02000000000000000000" pitchFamily="2" charset="0"/>
-                          <a:cs typeface="Ebrima" panose="02000000000000000000" pitchFamily="2" charset="0"/>
-                        </a:rPr>
-                        <a:t>1</a:t>
-                      </a:r>
-                      <a:endParaRPr lang="ko-KR" sz="1800">
-                        <a:effectLst/>
-                        <a:latin typeface="Ebrima" panose="02000000000000000000" pitchFamily="2" charset="0"/>
-                        <a:ea typeface="바탕"/>
-                        <a:cs typeface="Ebrima" panose="02000000000000000000" pitchFamily="2" charset="0"/>
-                      </a:endParaRPr>
-                    </a:p>
-                  </a:txBody>
-                  <a:tcPr marL="68580" marR="68580" marT="0" marB="0" anchor="ctr"/>
-                </a:tc>
-              </a:tr>
-              <a:tr h="370840">
-                <a:tc>
-                  <a:txBody>
-                    <a:bodyPr/>
-                    <a:lstStyle/>
-                    <a:p>
-                      <a:pPr algn="ctr">
-                        <a:spcAft>
-                          <a:spcPts val="0"/>
-                        </a:spcAft>
-                      </a:pPr>
-                      <a:r>
-                        <a:rPr lang="en-GB" sz="1800">
-                          <a:effectLst/>
-                          <a:latin typeface="Ebrima" panose="02000000000000000000" pitchFamily="2" charset="0"/>
-                          <a:ea typeface="Ebrima" panose="02000000000000000000" pitchFamily="2" charset="0"/>
-                          <a:cs typeface="Ebrima" panose="02000000000000000000" pitchFamily="2" charset="0"/>
-                        </a:rPr>
-                        <a:t>Alternative Plan 2</a:t>
-                      </a:r>
-                      <a:endParaRPr lang="ko-KR" sz="1800">
-                        <a:effectLst/>
-                        <a:latin typeface="Ebrima" panose="02000000000000000000" pitchFamily="2" charset="0"/>
-                        <a:ea typeface="바탕"/>
-                        <a:cs typeface="Ebrima" panose="02000000000000000000" pitchFamily="2" charset="0"/>
-                      </a:endParaRPr>
-                    </a:p>
-                  </a:txBody>
-                  <a:tcPr marL="68580" marR="68580" marT="0" marB="0" anchor="ctr"/>
-                </a:tc>
-                <a:tc>
-                  <a:txBody>
-                    <a:bodyPr/>
-                    <a:lstStyle/>
-                    <a:p>
-                      <a:pPr algn="ctr">
-                        <a:spcAft>
-                          <a:spcPts val="0"/>
-                        </a:spcAft>
-                      </a:pPr>
-                      <a:r>
-                        <a:rPr lang="en-GB" sz="1800" dirty="0">
-                          <a:effectLst/>
-                          <a:latin typeface="Ebrima" panose="02000000000000000000" pitchFamily="2" charset="0"/>
-                          <a:ea typeface="Ebrima" panose="02000000000000000000" pitchFamily="2" charset="0"/>
-                          <a:cs typeface="Ebrima" panose="02000000000000000000" pitchFamily="2" charset="0"/>
-                        </a:rPr>
-                        <a:t>Immediate</a:t>
-                      </a:r>
-                      <a:endParaRPr lang="ko-KR" sz="1800" dirty="0">
-                        <a:effectLst/>
-                        <a:latin typeface="Ebrima" panose="02000000000000000000" pitchFamily="2" charset="0"/>
-                        <a:ea typeface="바탕"/>
-                        <a:cs typeface="Ebrima" panose="02000000000000000000" pitchFamily="2" charset="0"/>
-                      </a:endParaRPr>
-                    </a:p>
-                  </a:txBody>
-                  <a:tcPr marL="68580" marR="68580" marT="0" marB="0" anchor="ctr"/>
-                </a:tc>
-                <a:tc>
-                  <a:txBody>
-                    <a:bodyPr/>
-                    <a:lstStyle/>
-                    <a:p>
-                      <a:pPr algn="ctr">
-                        <a:spcAft>
-                          <a:spcPts val="0"/>
-                        </a:spcAft>
-                      </a:pPr>
-                      <a:r>
-                        <a:rPr lang="en-GB" sz="1800">
-                          <a:effectLst/>
-                          <a:latin typeface="Ebrima" panose="02000000000000000000" pitchFamily="2" charset="0"/>
-                          <a:ea typeface="Ebrima" panose="02000000000000000000" pitchFamily="2" charset="0"/>
-                          <a:cs typeface="Ebrima" panose="02000000000000000000" pitchFamily="2" charset="0"/>
-                        </a:rPr>
-                        <a:t>2</a:t>
-                      </a:r>
-                      <a:endParaRPr lang="ko-KR" sz="1800">
-                        <a:effectLst/>
-                        <a:latin typeface="Ebrima" panose="02000000000000000000" pitchFamily="2" charset="0"/>
-                        <a:ea typeface="바탕"/>
-                        <a:cs typeface="Ebrima" panose="02000000000000000000" pitchFamily="2" charset="0"/>
-                      </a:endParaRPr>
-                    </a:p>
-                  </a:txBody>
-                  <a:tcPr marL="68580" marR="68580" marT="0" marB="0" anchor="ctr"/>
-                </a:tc>
-              </a:tr>
-              <a:tr h="370840">
-                <a:tc>
-                  <a:txBody>
-                    <a:bodyPr/>
-                    <a:lstStyle/>
-                    <a:p>
-                      <a:pPr algn="ctr">
-                        <a:spcAft>
-                          <a:spcPts val="0"/>
-                        </a:spcAft>
-                      </a:pPr>
-                      <a:r>
-                        <a:rPr lang="en-GB" sz="1800">
-                          <a:effectLst/>
-                          <a:latin typeface="Ebrima" panose="02000000000000000000" pitchFamily="2" charset="0"/>
-                          <a:ea typeface="Ebrima" panose="02000000000000000000" pitchFamily="2" charset="0"/>
-                          <a:cs typeface="Ebrima" panose="02000000000000000000" pitchFamily="2" charset="0"/>
-                        </a:rPr>
-                        <a:t>Alternative Plan 3</a:t>
-                      </a:r>
-                      <a:endParaRPr lang="ko-KR" sz="1800">
-                        <a:effectLst/>
-                        <a:latin typeface="Ebrima" panose="02000000000000000000" pitchFamily="2" charset="0"/>
-                        <a:ea typeface="바탕"/>
-                        <a:cs typeface="Ebrima" panose="02000000000000000000" pitchFamily="2" charset="0"/>
-                      </a:endParaRPr>
-                    </a:p>
-                  </a:txBody>
-                  <a:tcPr marL="68580" marR="68580" marT="0" marB="0" anchor="ctr"/>
-                </a:tc>
-                <a:tc>
-                  <a:txBody>
-                    <a:bodyPr/>
-                    <a:lstStyle/>
-                    <a:p>
-                      <a:pPr algn="ctr">
-                        <a:spcAft>
-                          <a:spcPts val="0"/>
-                        </a:spcAft>
-                      </a:pPr>
-                      <a:r>
-                        <a:rPr lang="en-GB" sz="1800" dirty="0">
-                          <a:effectLst/>
-                          <a:latin typeface="Ebrima" panose="02000000000000000000" pitchFamily="2" charset="0"/>
-                          <a:ea typeface="Ebrima" panose="02000000000000000000" pitchFamily="2" charset="0"/>
-                          <a:cs typeface="Ebrima" panose="02000000000000000000" pitchFamily="2" charset="0"/>
-                        </a:rPr>
-                        <a:t>Random</a:t>
-                      </a:r>
-                      <a:endParaRPr lang="ko-KR" sz="1800" dirty="0">
-                        <a:effectLst/>
-                        <a:latin typeface="Ebrima" panose="02000000000000000000" pitchFamily="2" charset="0"/>
-                        <a:ea typeface="바탕"/>
-                        <a:cs typeface="Ebrima" panose="02000000000000000000" pitchFamily="2" charset="0"/>
-                      </a:endParaRPr>
-                    </a:p>
-                  </a:txBody>
-                  <a:tcPr marL="68580" marR="68580" marT="0" marB="0" anchor="ctr"/>
-                </a:tc>
-                <a:tc>
-                  <a:txBody>
-                    <a:bodyPr/>
-                    <a:lstStyle/>
-                    <a:p>
-                      <a:pPr algn="ctr">
-                        <a:spcAft>
-                          <a:spcPts val="0"/>
-                        </a:spcAft>
-                      </a:pPr>
-                      <a:r>
-                        <a:rPr lang="en-GB" sz="1800" dirty="0">
-                          <a:effectLst/>
-                          <a:latin typeface="Ebrima" panose="02000000000000000000" pitchFamily="2" charset="0"/>
-                          <a:ea typeface="Ebrima" panose="02000000000000000000" pitchFamily="2" charset="0"/>
-                          <a:cs typeface="Ebrima" panose="02000000000000000000" pitchFamily="2" charset="0"/>
-                        </a:rPr>
-                        <a:t>2</a:t>
-                      </a:r>
-                      <a:endParaRPr lang="ko-KR" sz="1800" dirty="0">
-                        <a:effectLst/>
-                        <a:latin typeface="Ebrima" panose="02000000000000000000" pitchFamily="2" charset="0"/>
-                        <a:ea typeface="바탕"/>
-                        <a:cs typeface="Ebrima" panose="02000000000000000000" pitchFamily="2" charset="0"/>
-                      </a:endParaRPr>
-                    </a:p>
-                  </a:txBody>
-                  <a:tcPr marL="68580" marR="68580" marT="0" marB="0" anchor="ctr"/>
-                </a:tc>
-              </a:tr>
-              <a:tr h="370840">
-                <a:tc>
-                  <a:txBody>
-                    <a:bodyPr/>
-                    <a:lstStyle/>
-                    <a:p>
-                      <a:pPr algn="ctr">
-                        <a:spcAft>
-                          <a:spcPts val="0"/>
-                        </a:spcAft>
-                      </a:pPr>
-                      <a:r>
-                        <a:rPr lang="en-GB" sz="1800">
-                          <a:effectLst/>
-                          <a:latin typeface="Ebrima" panose="02000000000000000000" pitchFamily="2" charset="0"/>
-                          <a:ea typeface="Ebrima" panose="02000000000000000000" pitchFamily="2" charset="0"/>
-                          <a:cs typeface="Ebrima" panose="02000000000000000000" pitchFamily="2" charset="0"/>
-                        </a:rPr>
-                        <a:t>Alternative Plan 4</a:t>
-                      </a:r>
-                      <a:endParaRPr lang="ko-KR" sz="1800">
-                        <a:effectLst/>
-                        <a:latin typeface="Ebrima" panose="02000000000000000000" pitchFamily="2" charset="0"/>
-                        <a:ea typeface="바탕"/>
-                        <a:cs typeface="Ebrima" panose="02000000000000000000" pitchFamily="2" charset="0"/>
-                      </a:endParaRPr>
-                    </a:p>
-                  </a:txBody>
-                  <a:tcPr marL="68580" marR="68580" marT="0" marB="0" anchor="ctr"/>
-                </a:tc>
-                <a:tc>
-                  <a:txBody>
-                    <a:bodyPr/>
-                    <a:lstStyle/>
-                    <a:p>
-                      <a:pPr algn="ctr">
-                        <a:spcAft>
-                          <a:spcPts val="0"/>
-                        </a:spcAft>
-                      </a:pPr>
-                      <a:r>
-                        <a:rPr lang="en-GB" sz="1800">
-                          <a:effectLst/>
-                          <a:latin typeface="Ebrima" panose="02000000000000000000" pitchFamily="2" charset="0"/>
-                          <a:ea typeface="Ebrima" panose="02000000000000000000" pitchFamily="2" charset="0"/>
-                          <a:cs typeface="Ebrima" panose="02000000000000000000" pitchFamily="2" charset="0"/>
-                        </a:rPr>
-                        <a:t>Immediate</a:t>
-                      </a:r>
-                      <a:endParaRPr lang="ko-KR" sz="1800">
-                        <a:effectLst/>
-                        <a:latin typeface="Ebrima" panose="02000000000000000000" pitchFamily="2" charset="0"/>
-                        <a:ea typeface="바탕"/>
-                        <a:cs typeface="Ebrima" panose="02000000000000000000" pitchFamily="2" charset="0"/>
-                      </a:endParaRPr>
-                    </a:p>
-                  </a:txBody>
-                  <a:tcPr marL="68580" marR="68580" marT="0" marB="0" anchor="ctr"/>
-                </a:tc>
-                <a:tc>
-                  <a:txBody>
-                    <a:bodyPr/>
-                    <a:lstStyle/>
-                    <a:p>
-                      <a:pPr algn="ctr">
-                        <a:spcAft>
-                          <a:spcPts val="0"/>
-                        </a:spcAft>
-                      </a:pPr>
-                      <a:r>
-                        <a:rPr lang="en-GB" sz="1800" dirty="0">
-                          <a:effectLst/>
-                          <a:latin typeface="Ebrima" panose="02000000000000000000" pitchFamily="2" charset="0"/>
-                          <a:ea typeface="Ebrima" panose="02000000000000000000" pitchFamily="2" charset="0"/>
-                          <a:cs typeface="Ebrima" panose="02000000000000000000" pitchFamily="2" charset="0"/>
-                        </a:rPr>
-                        <a:t>3</a:t>
-                      </a:r>
-                      <a:endParaRPr lang="ko-KR" sz="1800" dirty="0">
-                        <a:effectLst/>
-                        <a:latin typeface="Ebrima" panose="02000000000000000000" pitchFamily="2" charset="0"/>
-                        <a:ea typeface="바탕"/>
-                        <a:cs typeface="Ebrima" panose="02000000000000000000" pitchFamily="2" charset="0"/>
-                      </a:endParaRPr>
-                    </a:p>
-                  </a:txBody>
-                  <a:tcPr marL="68580" marR="68580" marT="0" marB="0" anchor="ctr"/>
-                </a:tc>
-              </a:tr>
-              <a:tr h="370840">
-                <a:tc>
-                  <a:txBody>
-                    <a:bodyPr/>
-                    <a:lstStyle/>
-                    <a:p>
-                      <a:pPr algn="ctr">
-                        <a:spcAft>
-                          <a:spcPts val="0"/>
-                        </a:spcAft>
-                      </a:pPr>
-                      <a:r>
-                        <a:rPr lang="en-GB" sz="1800">
-                          <a:effectLst/>
-                          <a:latin typeface="Ebrima" panose="02000000000000000000" pitchFamily="2" charset="0"/>
-                          <a:ea typeface="Ebrima" panose="02000000000000000000" pitchFamily="2" charset="0"/>
-                          <a:cs typeface="Ebrima" panose="02000000000000000000" pitchFamily="2" charset="0"/>
-                        </a:rPr>
-                        <a:t>Alternative Plan 5</a:t>
-                      </a:r>
-                      <a:endParaRPr lang="ko-KR" sz="1800">
-                        <a:effectLst/>
-                        <a:latin typeface="Ebrima" panose="02000000000000000000" pitchFamily="2" charset="0"/>
-                        <a:ea typeface="바탕"/>
-                        <a:cs typeface="Ebrima" panose="02000000000000000000" pitchFamily="2" charset="0"/>
-                      </a:endParaRPr>
-                    </a:p>
-                  </a:txBody>
-                  <a:tcPr marL="68580" marR="68580" marT="0" marB="0" anchor="ctr"/>
-                </a:tc>
-                <a:tc>
-                  <a:txBody>
-                    <a:bodyPr/>
-                    <a:lstStyle/>
-                    <a:p>
-                      <a:pPr algn="ctr">
-                        <a:spcAft>
-                          <a:spcPts val="0"/>
-                        </a:spcAft>
-                      </a:pPr>
-                      <a:r>
-                        <a:rPr lang="en-GB" sz="1800">
-                          <a:effectLst/>
-                          <a:latin typeface="Ebrima" panose="02000000000000000000" pitchFamily="2" charset="0"/>
-                          <a:ea typeface="Ebrima" panose="02000000000000000000" pitchFamily="2" charset="0"/>
-                          <a:cs typeface="Ebrima" panose="02000000000000000000" pitchFamily="2" charset="0"/>
-                        </a:rPr>
-                        <a:t>Random</a:t>
-                      </a:r>
-                      <a:endParaRPr lang="ko-KR" sz="1800">
-                        <a:effectLst/>
-                        <a:latin typeface="Ebrima" panose="02000000000000000000" pitchFamily="2" charset="0"/>
-                        <a:ea typeface="바탕"/>
-                        <a:cs typeface="Ebrima" panose="02000000000000000000" pitchFamily="2" charset="0"/>
-                      </a:endParaRPr>
-                    </a:p>
-                  </a:txBody>
-                  <a:tcPr marL="68580" marR="68580" marT="0" marB="0" anchor="ctr"/>
-                </a:tc>
-                <a:tc>
-                  <a:txBody>
-                    <a:bodyPr/>
-                    <a:lstStyle/>
-                    <a:p>
-                      <a:pPr algn="ctr">
-                        <a:spcAft>
-                          <a:spcPts val="0"/>
-                        </a:spcAft>
-                      </a:pPr>
-                      <a:r>
-                        <a:rPr lang="en-GB" sz="1800" dirty="0">
-                          <a:effectLst/>
-                          <a:latin typeface="Ebrima" panose="02000000000000000000" pitchFamily="2" charset="0"/>
-                          <a:ea typeface="Ebrima" panose="02000000000000000000" pitchFamily="2" charset="0"/>
-                          <a:cs typeface="Ebrima" panose="02000000000000000000" pitchFamily="2" charset="0"/>
-                        </a:rPr>
-                        <a:t>3</a:t>
-                      </a:r>
-                      <a:endParaRPr lang="ko-KR" sz="1800" dirty="0">
-                        <a:effectLst/>
-                        <a:latin typeface="Ebrima" panose="02000000000000000000" pitchFamily="2" charset="0"/>
-                        <a:ea typeface="바탕"/>
-                        <a:cs typeface="Ebrima" panose="02000000000000000000" pitchFamily="2" charset="0"/>
-                      </a:endParaRPr>
-                    </a:p>
-                  </a:txBody>
-                  <a:tcPr marL="68580" marR="68580" marT="0" marB="0" anchor="ctr"/>
-                </a:tc>
-              </a:tr>
-            </a:tbl>
-          </a:graphicData>
-        </a:graphic>
-      </p:graphicFrame>
+        </p:nvSpPr>
+        <p:spPr>
+          <a:xfrm>
+            <a:off x="251520" y="1364905"/>
+            <a:ext cx="2160000" cy="400110"/>
+          </a:xfrm>
+          <a:prstGeom prst="rect">
+            <a:avLst/>
+          </a:prstGeom>
+          <a:solidFill>
+            <a:srgbClr val="97E4FF"/>
+          </a:solidFill>
+        </p:spPr>
+        <p:txBody>
+          <a:bodyPr wrap="square" rtlCol="0">
+            <a:spAutoFit/>
+          </a:bodyPr>
+          <a:lstStyle/>
+          <a:p>
+            <a:pPr algn="ctr"/>
+            <a:r>
+              <a:rPr lang="en-US" altLang="ko-KR" sz="2000" b="1" dirty="0" smtClean="0">
+                <a:latin typeface="Ebrima" panose="02000000000000000000" pitchFamily="2" charset="0"/>
+                <a:ea typeface="Ebrima" panose="02000000000000000000" pitchFamily="2" charset="0"/>
+                <a:cs typeface="Ebrima" panose="02000000000000000000" pitchFamily="2" charset="0"/>
+              </a:rPr>
+              <a:t>Original</a:t>
+            </a:r>
+            <a:endParaRPr lang="ko-KR" altLang="en-US" sz="2000" b="1" dirty="0">
+              <a:latin typeface="Ebrima" panose="02000000000000000000" pitchFamily="2" charset="0"/>
+              <a:cs typeface="Ebrima" panose="02000000000000000000" pitchFamily="2" charset="0"/>
+            </a:endParaRPr>
+          </a:p>
+        </p:txBody>
+      </p:sp>
     </p:spTree>
     <p:extLst>
       <p:ext uri="{BB962C8B-B14F-4D97-AF65-F5344CB8AC3E}">
-        <p14:creationId xmlns:p14="http://schemas.microsoft.com/office/powerpoint/2010/main" val="1217893747"/>
+        <p14:creationId xmlns:p14="http://schemas.microsoft.com/office/powerpoint/2010/main" val="1882690702"/>
       </p:ext>
     </p:extLst>
   </p:cSld>
@@ -7792,6 +7447,274 @@
           <a:chExt cx="0" cy="0"/>
         </a:xfrm>
       </p:grpSpPr>
+      <p:pic>
+        <p:nvPicPr>
+          <p:cNvPr id="3" name="图片 2"/>
+          <p:cNvPicPr>
+            <a:picLocks noChangeAspect="1"/>
+          </p:cNvPicPr>
+          <p:nvPr/>
+        </p:nvPicPr>
+        <p:blipFill>
+          <a:blip r:embed="rId2"/>
+          <a:stretch>
+            <a:fillRect/>
+          </a:stretch>
+        </p:blipFill>
+        <p:spPr>
+          <a:xfrm>
+            <a:off x="3059832" y="908721"/>
+            <a:ext cx="6120000" cy="4602585"/>
+          </a:xfrm>
+          <a:prstGeom prst="rect">
+            <a:avLst/>
+          </a:prstGeom>
+        </p:spPr>
+      </p:pic>
+      <p:pic>
+        <p:nvPicPr>
+          <p:cNvPr id="17" name="图片 16"/>
+          <p:cNvPicPr>
+            <a:picLocks noChangeAspect="1"/>
+          </p:cNvPicPr>
+          <p:nvPr/>
+        </p:nvPicPr>
+        <p:blipFill>
+          <a:blip r:embed="rId3"/>
+          <a:stretch>
+            <a:fillRect/>
+          </a:stretch>
+        </p:blipFill>
+        <p:spPr>
+          <a:xfrm>
+            <a:off x="3059832" y="908720"/>
+            <a:ext cx="6120000" cy="4602586"/>
+          </a:xfrm>
+          <a:prstGeom prst="rect">
+            <a:avLst/>
+          </a:prstGeom>
+        </p:spPr>
+      </p:pic>
+      <p:cxnSp>
+        <p:nvCxnSpPr>
+          <p:cNvPr id="8" name="直线连接符 7"/>
+          <p:cNvCxnSpPr/>
+          <p:nvPr/>
+        </p:nvCxnSpPr>
+        <p:spPr>
+          <a:xfrm>
+            <a:off x="3635216" y="4725144"/>
+            <a:ext cx="5400600" cy="0"/>
+          </a:xfrm>
+          <a:prstGeom prst="line">
+            <a:avLst/>
+          </a:prstGeom>
+          <a:ln w="28575"/>
+        </p:spPr>
+        <p:style>
+          <a:lnRef idx="1">
+            <a:schemeClr val="accent3"/>
+          </a:lnRef>
+          <a:fillRef idx="0">
+            <a:schemeClr val="accent3"/>
+          </a:fillRef>
+          <a:effectRef idx="0">
+            <a:schemeClr val="accent3"/>
+          </a:effectRef>
+          <a:fontRef idx="minor">
+            <a:schemeClr val="tx1"/>
+          </a:fontRef>
+        </p:style>
+      </p:cxnSp>
+      <p:cxnSp>
+        <p:nvCxnSpPr>
+          <p:cNvPr id="9" name="直线连接符 8"/>
+          <p:cNvCxnSpPr/>
+          <p:nvPr/>
+        </p:nvCxnSpPr>
+        <p:spPr>
+          <a:xfrm>
+            <a:off x="3635216" y="3356992"/>
+            <a:ext cx="5400600" cy="0"/>
+          </a:xfrm>
+          <a:prstGeom prst="line">
+            <a:avLst/>
+          </a:prstGeom>
+          <a:ln w="28575"/>
+        </p:spPr>
+        <p:style>
+          <a:lnRef idx="1">
+            <a:schemeClr val="accent6"/>
+          </a:lnRef>
+          <a:fillRef idx="0">
+            <a:schemeClr val="accent6"/>
+          </a:fillRef>
+          <a:effectRef idx="0">
+            <a:schemeClr val="accent6"/>
+          </a:effectRef>
+          <a:fontRef idx="minor">
+            <a:schemeClr val="tx1"/>
+          </a:fontRef>
+        </p:style>
+      </p:cxnSp>
+      <p:sp>
+        <p:nvSpPr>
+          <p:cNvPr id="10" name="矩形 9"/>
+          <p:cNvSpPr/>
+          <p:nvPr/>
+        </p:nvSpPr>
+        <p:spPr>
+          <a:xfrm>
+            <a:off x="6299512" y="1268760"/>
+            <a:ext cx="1800200" cy="3744416"/>
+          </a:xfrm>
+          <a:prstGeom prst="rect">
+            <a:avLst/>
+          </a:prstGeom>
+          <a:solidFill>
+            <a:srgbClr val="FFC000">
+              <a:alpha val="30000"/>
+            </a:srgbClr>
+          </a:solidFill>
+          <a:ln>
+            <a:noFill/>
+          </a:ln>
+        </p:spPr>
+        <p:style>
+          <a:lnRef idx="2">
+            <a:schemeClr val="accent1">
+              <a:shade val="50000"/>
+            </a:schemeClr>
+          </a:lnRef>
+          <a:fillRef idx="1">
+            <a:schemeClr val="accent1"/>
+          </a:fillRef>
+          <a:effectRef idx="0">
+            <a:schemeClr val="accent1"/>
+          </a:effectRef>
+          <a:fontRef idx="minor">
+            <a:schemeClr val="lt1"/>
+          </a:fontRef>
+        </p:style>
+        <p:txBody>
+          <a:bodyPr rtlCol="0" anchor="ctr"/>
+          <a:lstStyle/>
+          <a:p>
+            <a:pPr algn="ctr"/>
+            <a:endParaRPr kumimoji="1" lang="zh-CN" altLang="en-US"/>
+          </a:p>
+        </p:txBody>
+      </p:sp>
+      <p:sp>
+        <p:nvSpPr>
+          <p:cNvPr id="16" name="TextBox 23"/>
+          <p:cNvSpPr txBox="1"/>
+          <p:nvPr/>
+        </p:nvSpPr>
+        <p:spPr>
+          <a:xfrm>
+            <a:off x="108003" y="1803588"/>
+            <a:ext cx="3095846" cy="3785652"/>
+          </a:xfrm>
+          <a:prstGeom prst="rect">
+            <a:avLst/>
+          </a:prstGeom>
+          <a:noFill/>
+        </p:spPr>
+        <p:txBody>
+          <a:bodyPr wrap="square" rtlCol="0">
+            <a:spAutoFit/>
+          </a:bodyPr>
+          <a:lstStyle/>
+          <a:p>
+            <a:pPr marL="342900" indent="-342900">
+              <a:lnSpc>
+                <a:spcPct val="120000"/>
+              </a:lnSpc>
+              <a:buFont typeface="Arial" panose="020B0604020202020204" pitchFamily="34" charset="0"/>
+              <a:buChar char="•"/>
+            </a:pPr>
+            <a:r>
+              <a:rPr lang="en-US" altLang="ko-KR" sz="2000" dirty="0" smtClean="0">
+                <a:latin typeface="Ebrima" panose="02000000000000000000" pitchFamily="2" charset="0"/>
+                <a:ea typeface="Ebrima" panose="02000000000000000000" pitchFamily="2" charset="0"/>
+                <a:cs typeface="Ebrima" panose="02000000000000000000" pitchFamily="2" charset="0"/>
+              </a:rPr>
+              <a:t>Optimization for 	Robustness</a:t>
+            </a:r>
+          </a:p>
+          <a:p>
+            <a:pPr marL="342900" indent="-342900">
+              <a:lnSpc>
+                <a:spcPct val="120000"/>
+              </a:lnSpc>
+              <a:buFont typeface="Arial" panose="020B0604020202020204" pitchFamily="34" charset="0"/>
+              <a:buChar char="•"/>
+            </a:pPr>
+            <a:r>
+              <a:rPr lang="en-US" altLang="ko-KR" sz="2000" dirty="0" smtClean="0">
+                <a:latin typeface="Ebrima" panose="02000000000000000000" pitchFamily="2" charset="0"/>
+                <a:ea typeface="Ebrima" panose="02000000000000000000" pitchFamily="2" charset="0"/>
+                <a:cs typeface="Ebrima" panose="02000000000000000000" pitchFamily="2" charset="0"/>
+              </a:rPr>
+              <a:t>SCHEME 1(0,1,1,1): 	good AP1</a:t>
+            </a:r>
+          </a:p>
+          <a:p>
+            <a:pPr>
+              <a:lnSpc>
+                <a:spcPct val="120000"/>
+              </a:lnSpc>
+            </a:pPr>
+            <a:r>
+              <a:rPr lang="en-US" altLang="ko-KR" sz="2000" dirty="0" smtClean="0">
+                <a:latin typeface="Ebrima" panose="02000000000000000000" pitchFamily="2" charset="0"/>
+                <a:ea typeface="Ebrima" panose="02000000000000000000" pitchFamily="2" charset="0"/>
+                <a:cs typeface="Ebrima" panose="02000000000000000000" pitchFamily="2" charset="0"/>
+              </a:rPr>
+              <a:t>-&gt;  SCHEME 2(0,2,2,2), 	4(0,4,4,4): </a:t>
+            </a:r>
+          </a:p>
+          <a:p>
+            <a:pPr>
+              <a:lnSpc>
+                <a:spcPct val="120000"/>
+              </a:lnSpc>
+            </a:pPr>
+            <a:r>
+              <a:rPr lang="en-US" altLang="ko-KR" sz="2000" dirty="0" smtClean="0">
+                <a:latin typeface="Ebrima" panose="02000000000000000000" pitchFamily="2" charset="0"/>
+                <a:ea typeface="Ebrima" panose="02000000000000000000" pitchFamily="2" charset="0"/>
+                <a:cs typeface="Ebrima" panose="02000000000000000000" pitchFamily="2" charset="0"/>
+              </a:rPr>
+              <a:t>	Random starting 	for AP 2 and 4 	needed</a:t>
+            </a:r>
+            <a:endParaRPr lang="en-US" altLang="ko-KR" sz="2000" dirty="0">
+              <a:latin typeface="Ebrima" panose="02000000000000000000" pitchFamily="2" charset="0"/>
+              <a:ea typeface="Ebrima" panose="02000000000000000000" pitchFamily="2" charset="0"/>
+              <a:cs typeface="Ebrima" panose="02000000000000000000" pitchFamily="2" charset="0"/>
+            </a:endParaRPr>
+          </a:p>
+          <a:p>
+            <a:pPr>
+              <a:lnSpc>
+                <a:spcPct val="120000"/>
+              </a:lnSpc>
+            </a:pPr>
+            <a:r>
+              <a:rPr lang="en-US" altLang="ko-KR" sz="2000" dirty="0" smtClean="0">
+                <a:latin typeface="Ebrima" panose="02000000000000000000" pitchFamily="2" charset="0"/>
+                <a:cs typeface="Ebrima" panose="02000000000000000000" pitchFamily="2" charset="0"/>
+              </a:rPr>
+              <a:t>-&gt;  Optimization for cost</a:t>
+            </a:r>
+            <a:endParaRPr lang="en-US" altLang="ko-KR" sz="2000" dirty="0">
+              <a:latin typeface="Ebrima" panose="02000000000000000000" pitchFamily="2" charset="0"/>
+              <a:cs typeface="Ebrima" panose="02000000000000000000" pitchFamily="2" charset="0"/>
+            </a:endParaRPr>
+          </a:p>
+        </p:txBody>
+      </p:sp>
       <p:sp>
         <p:nvSpPr>
           <p:cNvPr id="4" name="직사각형 3"/>
@@ -7847,7 +7770,7 @@
         <p:spPr>
           <a:xfrm>
             <a:off x="107504" y="44624"/>
-            <a:ext cx="6624496" cy="646331"/>
+            <a:ext cx="8784976" cy="646331"/>
           </a:xfrm>
           <a:prstGeom prst="rect">
             <a:avLst/>
@@ -7890,19 +7813,562 @@
                 <a:ea typeface="Ebrima" panose="02000000000000000000" pitchFamily="2" charset="0"/>
                 <a:cs typeface="Ebrima" panose="02000000000000000000" pitchFamily="2" charset="0"/>
               </a:rPr>
-              <a:t>ISCUSSION</a:t>
-            </a:r>
-            <a:endParaRPr lang="ko-KR" altLang="en-US" sz="2800" b="1" dirty="0">
+              <a:t>ISCUSSION- </a:t>
+            </a:r>
+            <a:r>
+              <a:rPr lang="en-US" altLang="ko-KR" sz="2400" b="1" dirty="0" smtClean="0">
+                <a:latin typeface="Ebrima" panose="02000000000000000000" pitchFamily="2" charset="0"/>
+                <a:ea typeface="Ebrima" panose="02000000000000000000" pitchFamily="2" charset="0"/>
+                <a:cs typeface="Ebrima" panose="02000000000000000000" pitchFamily="2" charset="0"/>
+              </a:rPr>
+              <a:t>Preliminary </a:t>
+            </a:r>
+            <a:r>
+              <a:rPr lang="en-US" altLang="ko-KR" sz="2400" b="1" dirty="0">
+                <a:latin typeface="Ebrima" panose="02000000000000000000" pitchFamily="2" charset="0"/>
+                <a:ea typeface="Ebrima" panose="02000000000000000000" pitchFamily="2" charset="0"/>
+                <a:cs typeface="Ebrima" panose="02000000000000000000" pitchFamily="2" charset="0"/>
+              </a:rPr>
+              <a:t>Experiment</a:t>
+            </a:r>
+            <a:endParaRPr lang="ko-KR" altLang="en-US" sz="2400" b="1" dirty="0">
               <a:latin typeface="Ebrima" panose="02000000000000000000" pitchFamily="2" charset="0"/>
               <a:cs typeface="Ebrima" panose="02000000000000000000" pitchFamily="2" charset="0"/>
             </a:endParaRPr>
           </a:p>
         </p:txBody>
       </p:sp>
+      <p:sp>
+        <p:nvSpPr>
+          <p:cNvPr id="11" name="TextBox 20"/>
+          <p:cNvSpPr txBox="1"/>
+          <p:nvPr/>
+        </p:nvSpPr>
+        <p:spPr>
+          <a:xfrm>
+            <a:off x="251520" y="1364905"/>
+            <a:ext cx="2160000" cy="400110"/>
+          </a:xfrm>
+          <a:prstGeom prst="rect">
+            <a:avLst/>
+          </a:prstGeom>
+          <a:solidFill>
+            <a:srgbClr val="97E4FF"/>
+          </a:solidFill>
+        </p:spPr>
+        <p:txBody>
+          <a:bodyPr wrap="square" rtlCol="0">
+            <a:spAutoFit/>
+          </a:bodyPr>
+          <a:lstStyle/>
+          <a:p>
+            <a:pPr algn="ctr"/>
+            <a:r>
+              <a:rPr lang="en-US" altLang="ko-KR" sz="2000" b="1" dirty="0" smtClean="0">
+                <a:latin typeface="Ebrima" panose="02000000000000000000" pitchFamily="2" charset="0"/>
+                <a:ea typeface="Ebrima" panose="02000000000000000000" pitchFamily="2" charset="0"/>
+                <a:cs typeface="Ebrima" panose="02000000000000000000" pitchFamily="2" charset="0"/>
+              </a:rPr>
+              <a:t>Results</a:t>
+            </a:r>
+            <a:endParaRPr lang="ko-KR" altLang="en-US" sz="2000" b="1" dirty="0">
+              <a:latin typeface="Ebrima" panose="02000000000000000000" pitchFamily="2" charset="0"/>
+              <a:cs typeface="Ebrima" panose="02000000000000000000" pitchFamily="2" charset="0"/>
+            </a:endParaRPr>
+          </a:p>
+        </p:txBody>
+      </p:sp>
+      <p:graphicFrame>
+        <p:nvGraphicFramePr>
+          <p:cNvPr id="13" name="표 9"/>
+          <p:cNvGraphicFramePr>
+            <a:graphicFrameLocks noGrp="1"/>
+          </p:cNvGraphicFramePr>
+          <p:nvPr>
+            <p:extLst>
+              <p:ext uri="{D42A27DB-BD31-4B8C-83A1-F6EECF244321}">
+                <p14:modId xmlns:p14="http://schemas.microsoft.com/office/powerpoint/2010/main" val="1670809211"/>
+              </p:ext>
+            </p:extLst>
+          </p:nvPr>
+        </p:nvGraphicFramePr>
+        <p:xfrm>
+          <a:off x="3383324" y="5445225"/>
+          <a:ext cx="5760676" cy="1386970"/>
+        </p:xfrm>
+        <a:graphic>
+          <a:graphicData uri="http://schemas.openxmlformats.org/drawingml/2006/table">
+            <a:tbl>
+              <a:tblPr firstRow="1" bandRow="1">
+                <a:tableStyleId>{5C22544A-7EE6-4342-B048-85BDC9FD1C3A}</a:tableStyleId>
+              </a:tblPr>
+              <a:tblGrid>
+                <a:gridCol w="1296155"/>
+                <a:gridCol w="3024356"/>
+                <a:gridCol w="1440165"/>
+              </a:tblGrid>
+              <a:tr h="277174">
+                <a:tc>
+                  <a:txBody>
+                    <a:bodyPr/>
+                    <a:lstStyle/>
+                    <a:p>
+                      <a:pPr algn="ctr">
+                        <a:spcAft>
+                          <a:spcPts val="0"/>
+                        </a:spcAft>
+                      </a:pPr>
+                      <a:r>
+                        <a:rPr lang="en-GB" sz="1600" dirty="0" smtClean="0">
+                          <a:effectLst/>
+                          <a:latin typeface="Ebrima" panose="02000000000000000000" pitchFamily="2" charset="0"/>
+                          <a:ea typeface="Ebrima" panose="02000000000000000000" pitchFamily="2" charset="0"/>
+                          <a:cs typeface="Ebrima" panose="02000000000000000000" pitchFamily="2" charset="0"/>
+                        </a:rPr>
+                        <a:t>Plan</a:t>
+                      </a:r>
+                      <a:r>
+                        <a:rPr lang="en-GB" sz="1600" dirty="0">
+                          <a:effectLst/>
+                          <a:latin typeface="Ebrima" panose="02000000000000000000" pitchFamily="2" charset="0"/>
+                          <a:ea typeface="Ebrima" panose="02000000000000000000" pitchFamily="2" charset="0"/>
+                          <a:cs typeface="Ebrima" panose="02000000000000000000" pitchFamily="2" charset="0"/>
+                        </a:rPr>
+                        <a:t> </a:t>
+                      </a:r>
+                      <a:endParaRPr lang="ko-KR" sz="1600" dirty="0">
+                        <a:effectLst/>
+                        <a:latin typeface="Ebrima" panose="02000000000000000000" pitchFamily="2" charset="0"/>
+                        <a:ea typeface="바탕"/>
+                        <a:cs typeface="Ebrima" panose="02000000000000000000" pitchFamily="2" charset="0"/>
+                      </a:endParaRPr>
+                    </a:p>
+                  </a:txBody>
+                  <a:tcPr marL="68580" marR="68580" marT="0" marB="0" anchor="ctr"/>
+                </a:tc>
+                <a:tc>
+                  <a:txBody>
+                    <a:bodyPr/>
+                    <a:lstStyle/>
+                    <a:p>
+                      <a:pPr algn="ctr">
+                        <a:spcAft>
+                          <a:spcPts val="0"/>
+                        </a:spcAft>
+                      </a:pPr>
+                      <a:r>
+                        <a:rPr lang="en-GB" sz="1600" dirty="0">
+                          <a:effectLst/>
+                          <a:latin typeface="Ebrima" panose="02000000000000000000" pitchFamily="2" charset="0"/>
+                          <a:ea typeface="Ebrima" panose="02000000000000000000" pitchFamily="2" charset="0"/>
+                          <a:cs typeface="Ebrima" panose="02000000000000000000" pitchFamily="2" charset="0"/>
+                        </a:rPr>
+                        <a:t>Start</a:t>
+                      </a:r>
+                      <a:endParaRPr lang="ko-KR" sz="1600" dirty="0">
+                        <a:effectLst/>
+                        <a:latin typeface="Ebrima" panose="02000000000000000000" pitchFamily="2" charset="0"/>
+                        <a:ea typeface="바탕"/>
+                        <a:cs typeface="Ebrima" panose="02000000000000000000" pitchFamily="2" charset="0"/>
+                      </a:endParaRPr>
+                    </a:p>
+                  </a:txBody>
+                  <a:tcPr marL="68580" marR="68580" marT="0" marB="0" anchor="ctr"/>
+                </a:tc>
+                <a:tc>
+                  <a:txBody>
+                    <a:bodyPr/>
+                    <a:lstStyle/>
+                    <a:p>
+                      <a:pPr algn="ctr">
+                        <a:spcAft>
+                          <a:spcPts val="0"/>
+                        </a:spcAft>
+                      </a:pPr>
+                      <a:r>
+                        <a:rPr lang="en-GB" sz="1600" dirty="0" smtClean="0">
+                          <a:effectLst/>
+                          <a:latin typeface="Ebrima" panose="02000000000000000000" pitchFamily="2" charset="0"/>
+                          <a:ea typeface="Ebrima" panose="02000000000000000000" pitchFamily="2" charset="0"/>
+                          <a:cs typeface="Ebrima" panose="02000000000000000000" pitchFamily="2" charset="0"/>
+                        </a:rPr>
+                        <a:t>Steps</a:t>
+                      </a:r>
+                      <a:endParaRPr lang="ko-KR" sz="1600" dirty="0">
+                        <a:effectLst/>
+                        <a:latin typeface="Ebrima" panose="02000000000000000000" pitchFamily="2" charset="0"/>
+                        <a:ea typeface="바탕"/>
+                        <a:cs typeface="Ebrima" panose="02000000000000000000" pitchFamily="2" charset="0"/>
+                      </a:endParaRPr>
+                    </a:p>
+                  </a:txBody>
+                  <a:tcPr marL="68580" marR="68580" marT="0" marB="0" anchor="ctr"/>
+                </a:tc>
+              </a:tr>
+              <a:tr h="277449">
+                <a:tc>
+                  <a:txBody>
+                    <a:bodyPr/>
+                    <a:lstStyle/>
+                    <a:p>
+                      <a:pPr algn="ctr">
+                        <a:spcAft>
+                          <a:spcPts val="0"/>
+                        </a:spcAft>
+                      </a:pPr>
+                      <a:r>
+                        <a:rPr lang="en-US" altLang="ko-KR" sz="1600" dirty="0" smtClean="0">
+                          <a:effectLst/>
+                          <a:latin typeface="Ebrima" panose="02000000000000000000" pitchFamily="2" charset="0"/>
+                          <a:ea typeface="바탕"/>
+                          <a:cs typeface="Ebrima" panose="02000000000000000000" pitchFamily="2" charset="0"/>
+                        </a:rPr>
+                        <a:t>0</a:t>
+                      </a:r>
+                      <a:endParaRPr lang="ko-KR" sz="1600" dirty="0">
+                        <a:effectLst/>
+                        <a:latin typeface="Ebrima" panose="02000000000000000000" pitchFamily="2" charset="0"/>
+                        <a:ea typeface="바탕"/>
+                        <a:cs typeface="Ebrima" panose="02000000000000000000" pitchFamily="2" charset="0"/>
+                      </a:endParaRPr>
+                    </a:p>
+                  </a:txBody>
+                  <a:tcPr marL="68580" marR="68580" marT="0" marB="0" anchor="ctr"/>
+                </a:tc>
+                <a:tc>
+                  <a:txBody>
+                    <a:bodyPr/>
+                    <a:lstStyle/>
+                    <a:p>
+                      <a:pPr algn="ctr">
+                        <a:spcAft>
+                          <a:spcPts val="0"/>
+                        </a:spcAft>
+                      </a:pPr>
+                      <a:r>
+                        <a:rPr lang="en-GB" sz="1600" dirty="0">
+                          <a:effectLst/>
+                          <a:latin typeface="Ebrima" panose="02000000000000000000" pitchFamily="2" charset="0"/>
+                          <a:ea typeface="Ebrima" panose="02000000000000000000" pitchFamily="2" charset="0"/>
+                          <a:cs typeface="Ebrima" panose="02000000000000000000" pitchFamily="2" charset="0"/>
+                        </a:rPr>
+                        <a:t>Immediate</a:t>
+                      </a:r>
+                      <a:endParaRPr lang="ko-KR" sz="1600" dirty="0">
+                        <a:effectLst/>
+                        <a:latin typeface="Ebrima" panose="02000000000000000000" pitchFamily="2" charset="0"/>
+                        <a:ea typeface="바탕"/>
+                        <a:cs typeface="Ebrima" panose="02000000000000000000" pitchFamily="2" charset="0"/>
+                      </a:endParaRPr>
+                    </a:p>
+                  </a:txBody>
+                  <a:tcPr marL="68580" marR="68580" marT="0" marB="0" anchor="ctr"/>
+                </a:tc>
+                <a:tc>
+                  <a:txBody>
+                    <a:bodyPr/>
+                    <a:lstStyle/>
+                    <a:p>
+                      <a:pPr algn="ctr">
+                        <a:spcAft>
+                          <a:spcPts val="0"/>
+                        </a:spcAft>
+                      </a:pPr>
+                      <a:r>
+                        <a:rPr lang="en-GB" sz="1600">
+                          <a:effectLst/>
+                          <a:latin typeface="Ebrima" panose="02000000000000000000" pitchFamily="2" charset="0"/>
+                          <a:ea typeface="Ebrima" panose="02000000000000000000" pitchFamily="2" charset="0"/>
+                          <a:cs typeface="Ebrima" panose="02000000000000000000" pitchFamily="2" charset="0"/>
+                        </a:rPr>
+                        <a:t>1</a:t>
+                      </a:r>
+                      <a:endParaRPr lang="ko-KR" sz="1600">
+                        <a:effectLst/>
+                        <a:latin typeface="Ebrima" panose="02000000000000000000" pitchFamily="2" charset="0"/>
+                        <a:ea typeface="바탕"/>
+                        <a:cs typeface="Ebrima" panose="02000000000000000000" pitchFamily="2" charset="0"/>
+                      </a:endParaRPr>
+                    </a:p>
+                  </a:txBody>
+                  <a:tcPr marL="68580" marR="68580" marT="0" marB="0" anchor="ctr"/>
+                </a:tc>
+              </a:tr>
+              <a:tr h="277449">
+                <a:tc>
+                  <a:txBody>
+                    <a:bodyPr/>
+                    <a:lstStyle/>
+                    <a:p>
+                      <a:pPr algn="ctr">
+                        <a:spcAft>
+                          <a:spcPts val="0"/>
+                        </a:spcAft>
+                      </a:pPr>
+                      <a:r>
+                        <a:rPr lang="en-GB" sz="1600" dirty="0" smtClean="0">
+                          <a:effectLst/>
+                          <a:latin typeface="Ebrima" panose="02000000000000000000" pitchFamily="2" charset="0"/>
+                          <a:ea typeface="Ebrima" panose="02000000000000000000" pitchFamily="2" charset="0"/>
+                          <a:cs typeface="Ebrima" panose="02000000000000000000" pitchFamily="2" charset="0"/>
+                        </a:rPr>
+                        <a:t>1</a:t>
+                      </a:r>
+                      <a:endParaRPr lang="ko-KR" sz="1600" dirty="0">
+                        <a:effectLst/>
+                        <a:latin typeface="Ebrima" panose="02000000000000000000" pitchFamily="2" charset="0"/>
+                        <a:ea typeface="바탕"/>
+                        <a:cs typeface="Ebrima" panose="02000000000000000000" pitchFamily="2" charset="0"/>
+                      </a:endParaRPr>
+                    </a:p>
+                  </a:txBody>
+                  <a:tcPr marL="68580" marR="68580" marT="0" marB="0" anchor="ctr"/>
+                </a:tc>
+                <a:tc>
+                  <a:txBody>
+                    <a:bodyPr/>
+                    <a:lstStyle/>
+                    <a:p>
+                      <a:pPr algn="ctr">
+                        <a:spcAft>
+                          <a:spcPts val="0"/>
+                        </a:spcAft>
+                      </a:pPr>
+                      <a:r>
+                        <a:rPr lang="en-GB" sz="1600" dirty="0">
+                          <a:effectLst/>
+                          <a:latin typeface="Ebrima" panose="02000000000000000000" pitchFamily="2" charset="0"/>
+                          <a:ea typeface="Ebrima" panose="02000000000000000000" pitchFamily="2" charset="0"/>
+                          <a:cs typeface="Ebrima" panose="02000000000000000000" pitchFamily="2" charset="0"/>
+                        </a:rPr>
+                        <a:t>Random</a:t>
+                      </a:r>
+                      <a:endParaRPr lang="ko-KR" sz="1600" dirty="0">
+                        <a:effectLst/>
+                        <a:latin typeface="Ebrima" panose="02000000000000000000" pitchFamily="2" charset="0"/>
+                        <a:ea typeface="바탕"/>
+                        <a:cs typeface="Ebrima" panose="02000000000000000000" pitchFamily="2" charset="0"/>
+                      </a:endParaRPr>
+                    </a:p>
+                  </a:txBody>
+                  <a:tcPr marL="68580" marR="68580" marT="0" marB="0" anchor="ctr"/>
+                </a:tc>
+                <a:tc>
+                  <a:txBody>
+                    <a:bodyPr/>
+                    <a:lstStyle/>
+                    <a:p>
+                      <a:pPr algn="ctr">
+                        <a:spcAft>
+                          <a:spcPts val="0"/>
+                        </a:spcAft>
+                      </a:pPr>
+                      <a:r>
+                        <a:rPr lang="en-GB" sz="1600">
+                          <a:effectLst/>
+                          <a:latin typeface="Ebrima" panose="02000000000000000000" pitchFamily="2" charset="0"/>
+                          <a:ea typeface="Ebrima" panose="02000000000000000000" pitchFamily="2" charset="0"/>
+                          <a:cs typeface="Ebrima" panose="02000000000000000000" pitchFamily="2" charset="0"/>
+                        </a:rPr>
+                        <a:t>1</a:t>
+                      </a:r>
+                      <a:endParaRPr lang="ko-KR" sz="1600">
+                        <a:effectLst/>
+                        <a:latin typeface="Ebrima" panose="02000000000000000000" pitchFamily="2" charset="0"/>
+                        <a:ea typeface="바탕"/>
+                        <a:cs typeface="Ebrima" panose="02000000000000000000" pitchFamily="2" charset="0"/>
+                      </a:endParaRPr>
+                    </a:p>
+                  </a:txBody>
+                  <a:tcPr marL="68580" marR="68580" marT="0" marB="0" anchor="ctr"/>
+                </a:tc>
+              </a:tr>
+              <a:tr h="277449">
+                <a:tc>
+                  <a:txBody>
+                    <a:bodyPr/>
+                    <a:lstStyle/>
+                    <a:p>
+                      <a:pPr algn="ctr">
+                        <a:spcAft>
+                          <a:spcPts val="0"/>
+                        </a:spcAft>
+                      </a:pPr>
+                      <a:r>
+                        <a:rPr lang="en-GB" sz="1600" dirty="0" smtClean="0">
+                          <a:effectLst/>
+                          <a:latin typeface="Ebrima" panose="02000000000000000000" pitchFamily="2" charset="0"/>
+                          <a:ea typeface="Ebrima" panose="02000000000000000000" pitchFamily="2" charset="0"/>
+                          <a:cs typeface="Ebrima" panose="02000000000000000000" pitchFamily="2" charset="0"/>
+                        </a:rPr>
+                        <a:t>2</a:t>
+                      </a:r>
+                      <a:endParaRPr lang="ko-KR" sz="1600" dirty="0">
+                        <a:effectLst/>
+                        <a:latin typeface="Ebrima" panose="02000000000000000000" pitchFamily="2" charset="0"/>
+                        <a:ea typeface="바탕"/>
+                        <a:cs typeface="Ebrima" panose="02000000000000000000" pitchFamily="2" charset="0"/>
+                      </a:endParaRPr>
+                    </a:p>
+                  </a:txBody>
+                  <a:tcPr marL="68580" marR="68580" marT="0" marB="0" anchor="ctr"/>
+                </a:tc>
+                <a:tc>
+                  <a:txBody>
+                    <a:bodyPr/>
+                    <a:lstStyle/>
+                    <a:p>
+                      <a:pPr algn="ctr">
+                        <a:spcAft>
+                          <a:spcPts val="0"/>
+                        </a:spcAft>
+                      </a:pPr>
+                      <a:r>
+                        <a:rPr lang="en-GB" sz="1600" dirty="0">
+                          <a:effectLst/>
+                          <a:latin typeface="Ebrima" panose="02000000000000000000" pitchFamily="2" charset="0"/>
+                          <a:ea typeface="Ebrima" panose="02000000000000000000" pitchFamily="2" charset="0"/>
+                          <a:cs typeface="Ebrima" panose="02000000000000000000" pitchFamily="2" charset="0"/>
+                        </a:rPr>
+                        <a:t>Immediate</a:t>
+                      </a:r>
+                      <a:endParaRPr lang="ko-KR" sz="1600" dirty="0">
+                        <a:effectLst/>
+                        <a:latin typeface="Ebrima" panose="02000000000000000000" pitchFamily="2" charset="0"/>
+                        <a:ea typeface="바탕"/>
+                        <a:cs typeface="Ebrima" panose="02000000000000000000" pitchFamily="2" charset="0"/>
+                      </a:endParaRPr>
+                    </a:p>
+                  </a:txBody>
+                  <a:tcPr marL="68580" marR="68580" marT="0" marB="0" anchor="ctr"/>
+                </a:tc>
+                <a:tc>
+                  <a:txBody>
+                    <a:bodyPr/>
+                    <a:lstStyle/>
+                    <a:p>
+                      <a:pPr algn="ctr">
+                        <a:spcAft>
+                          <a:spcPts val="0"/>
+                        </a:spcAft>
+                      </a:pPr>
+                      <a:r>
+                        <a:rPr lang="en-GB" sz="1600">
+                          <a:effectLst/>
+                          <a:latin typeface="Ebrima" panose="02000000000000000000" pitchFamily="2" charset="0"/>
+                          <a:ea typeface="Ebrima" panose="02000000000000000000" pitchFamily="2" charset="0"/>
+                          <a:cs typeface="Ebrima" panose="02000000000000000000" pitchFamily="2" charset="0"/>
+                        </a:rPr>
+                        <a:t>2</a:t>
+                      </a:r>
+                      <a:endParaRPr lang="ko-KR" sz="1600">
+                        <a:effectLst/>
+                        <a:latin typeface="Ebrima" panose="02000000000000000000" pitchFamily="2" charset="0"/>
+                        <a:ea typeface="바탕"/>
+                        <a:cs typeface="Ebrima" panose="02000000000000000000" pitchFamily="2" charset="0"/>
+                      </a:endParaRPr>
+                    </a:p>
+                  </a:txBody>
+                  <a:tcPr marL="68580" marR="68580" marT="0" marB="0" anchor="ctr"/>
+                </a:tc>
+              </a:tr>
+              <a:tr h="277449">
+                <a:tc>
+                  <a:txBody>
+                    <a:bodyPr/>
+                    <a:lstStyle/>
+                    <a:p>
+                      <a:pPr algn="ctr">
+                        <a:spcAft>
+                          <a:spcPts val="0"/>
+                        </a:spcAft>
+                      </a:pPr>
+                      <a:r>
+                        <a:rPr lang="en-GB" sz="1600" dirty="0" smtClean="0">
+                          <a:effectLst/>
+                          <a:latin typeface="Ebrima" panose="02000000000000000000" pitchFamily="2" charset="0"/>
+                          <a:ea typeface="Ebrima" panose="02000000000000000000" pitchFamily="2" charset="0"/>
+                          <a:cs typeface="Ebrima" panose="02000000000000000000" pitchFamily="2" charset="0"/>
+                        </a:rPr>
+                        <a:t>4</a:t>
+                      </a:r>
+                      <a:endParaRPr lang="ko-KR" sz="1600" dirty="0">
+                        <a:effectLst/>
+                        <a:latin typeface="Ebrima" panose="02000000000000000000" pitchFamily="2" charset="0"/>
+                        <a:ea typeface="바탕"/>
+                        <a:cs typeface="Ebrima" panose="02000000000000000000" pitchFamily="2" charset="0"/>
+                      </a:endParaRPr>
+                    </a:p>
+                  </a:txBody>
+                  <a:tcPr marL="68580" marR="68580" marT="0" marB="0" anchor="ctr"/>
+                </a:tc>
+                <a:tc>
+                  <a:txBody>
+                    <a:bodyPr/>
+                    <a:lstStyle/>
+                    <a:p>
+                      <a:pPr algn="ctr">
+                        <a:spcAft>
+                          <a:spcPts val="0"/>
+                        </a:spcAft>
+                      </a:pPr>
+                      <a:r>
+                        <a:rPr lang="en-GB" sz="1600" dirty="0">
+                          <a:effectLst/>
+                          <a:latin typeface="Ebrima" panose="02000000000000000000" pitchFamily="2" charset="0"/>
+                          <a:ea typeface="Ebrima" panose="02000000000000000000" pitchFamily="2" charset="0"/>
+                          <a:cs typeface="Ebrima" panose="02000000000000000000" pitchFamily="2" charset="0"/>
+                        </a:rPr>
+                        <a:t>Immediate</a:t>
+                      </a:r>
+                      <a:endParaRPr lang="ko-KR" sz="1600" dirty="0">
+                        <a:effectLst/>
+                        <a:latin typeface="Ebrima" panose="02000000000000000000" pitchFamily="2" charset="0"/>
+                        <a:ea typeface="바탕"/>
+                        <a:cs typeface="Ebrima" panose="02000000000000000000" pitchFamily="2" charset="0"/>
+                      </a:endParaRPr>
+                    </a:p>
+                  </a:txBody>
+                  <a:tcPr marL="68580" marR="68580" marT="0" marB="0" anchor="ctr"/>
+                </a:tc>
+                <a:tc>
+                  <a:txBody>
+                    <a:bodyPr/>
+                    <a:lstStyle/>
+                    <a:p>
+                      <a:pPr algn="ctr">
+                        <a:spcAft>
+                          <a:spcPts val="0"/>
+                        </a:spcAft>
+                      </a:pPr>
+                      <a:r>
+                        <a:rPr lang="en-GB" sz="1600" dirty="0">
+                          <a:effectLst/>
+                          <a:latin typeface="Ebrima" panose="02000000000000000000" pitchFamily="2" charset="0"/>
+                          <a:ea typeface="Ebrima" panose="02000000000000000000" pitchFamily="2" charset="0"/>
+                          <a:cs typeface="Ebrima" panose="02000000000000000000" pitchFamily="2" charset="0"/>
+                        </a:rPr>
+                        <a:t>3</a:t>
+                      </a:r>
+                      <a:endParaRPr lang="ko-KR" sz="1600" dirty="0">
+                        <a:effectLst/>
+                        <a:latin typeface="Ebrima" panose="02000000000000000000" pitchFamily="2" charset="0"/>
+                        <a:ea typeface="바탕"/>
+                        <a:cs typeface="Ebrima" panose="02000000000000000000" pitchFamily="2" charset="0"/>
+                      </a:endParaRPr>
+                    </a:p>
+                  </a:txBody>
+                  <a:tcPr marL="68580" marR="68580" marT="0" marB="0" anchor="ctr"/>
+                </a:tc>
+              </a:tr>
+            </a:tbl>
+          </a:graphicData>
+        </a:graphic>
+      </p:graphicFrame>
     </p:spTree>
     <p:extLst>
       <p:ext uri="{BB962C8B-B14F-4D97-AF65-F5344CB8AC3E}">
-        <p14:creationId xmlns:p14="http://schemas.microsoft.com/office/powerpoint/2010/main" val="4055719351"/>
+        <p14:creationId xmlns:p14="http://schemas.microsoft.com/office/powerpoint/2010/main" val="743238141"/>
       </p:ext>
     </p:extLst>
   </p:cSld>

</xml_diff>